<commit_message>
updated slides of weeks 5 and 6
</commit_message>
<xml_diff>
--- a/Slides/Week 5 - Graphs.pptx
+++ b/Slides/Week 5 - Graphs.pptx
@@ -533,7 +533,7 @@
       </p:grpSpPr>
       <p:sp>
         <p:nvSpPr>
-          <p:cNvPr id="2" name="Slide Image Placeholder 1"/>
+          <p:cNvPr id="2" name="Tijdelijke aanduiding voor dia-afbeelding 1"/>
           <p:cNvSpPr>
             <a:spLocks noGrp="1" noRot="1" noChangeAspect="1"/>
           </p:cNvSpPr>
@@ -545,7 +545,7 @@
       </p:sp>
       <p:sp>
         <p:nvSpPr>
-          <p:cNvPr id="3" name="Notes Placeholder 2"/>
+          <p:cNvPr id="3" name="Tijdelijke aanduiding voor notities 2"/>
           <p:cNvSpPr>
             <a:spLocks noGrp="1"/>
           </p:cNvSpPr>
@@ -558,23 +558,13 @@
           <a:bodyPr/>
           <a:lstStyle/>
           <a:p>
-            <a:r>
-              <a:rPr lang="en-US" dirty="0" smtClean="0"/>
-              <a:t>Graphs can be used to model many types of relations and processes in physical, biological, social and information systems. Many practical problems can be represented by graphs.</a:t>
-            </a:r>
-          </a:p>
-          <a:p>
-            <a:r>
-              <a:rPr lang="en-US" dirty="0" smtClean="0"/>
-              <a:t>In computer science, graphs are used to represent networks of communication, data organization, computational devices, the flow of computation, etc. For instance, the link structure of a website can be represented by a directed graph, in which the vertices represent web pages and directed edges represent links from one page to another. A similar approach can be taken to problems in travel, biology, computer chip design, and many other fields. The development of algorithms to handle graphs is therefore of major interest in computer science.</a:t>
-            </a:r>
-            <a:endParaRPr lang="en-GB" dirty="0"/>
-          </a:p>
-        </p:txBody>
-      </p:sp>
-      <p:sp>
-        <p:nvSpPr>
-          <p:cNvPr id="4" name="Slide Number Placeholder 3"/>
+            <a:endParaRPr lang="nl-NL"/>
+          </a:p>
+        </p:txBody>
+      </p:sp>
+      <p:sp>
+        <p:nvSpPr>
+          <p:cNvPr id="4" name="Tijdelijke aanduiding voor dianummer 3"/>
           <p:cNvSpPr>
             <a:spLocks noGrp="1"/>
           </p:cNvSpPr>
@@ -589,7 +579,7 @@
           <a:p>
             <a:fld id="{29573B9A-66FB-4A63-BCD5-E140B9429FD2}" type="slidenum">
               <a:rPr lang="en-GB" smtClean="0"/>
-              <a:t>4</a:t>
+              <a:t>2</a:t>
             </a:fld>
             <a:endParaRPr lang="en-GB"/>
           </a:p>
@@ -598,7 +588,7 @@
     </p:spTree>
     <p:extLst>
       <p:ext uri="{BB962C8B-B14F-4D97-AF65-F5344CB8AC3E}">
-        <p14:creationId xmlns:p14="http://schemas.microsoft.com/office/powerpoint/2010/main" val="343859629"/>
+        <p14:creationId xmlns:p14="http://schemas.microsoft.com/office/powerpoint/2010/main" val="548804040"/>
       </p:ext>
     </p:extLst>
   </p:cSld>
@@ -653,113 +643,14 @@
           <a:lstStyle/>
           <a:p>
             <a:r>
-              <a:rPr lang="en-US" sz="1200" b="0" i="0" kern="1200" dirty="0" smtClean="0">
-                <a:solidFill>
-                  <a:schemeClr val="tx1"/>
-                </a:solidFill>
-                <a:effectLst/>
-                <a:latin typeface="+mn-lt"/>
-                <a:ea typeface="+mn-ea"/>
-                <a:cs typeface="+mn-cs"/>
-              </a:rPr>
-              <a:t>Adjacency lists are generally preferred because they efficiently represent </a:t>
-            </a:r>
-            <a:r>
-              <a:rPr lang="en-US" sz="1200" b="0" i="0" u="none" strike="noStrike" kern="1200" dirty="0" smtClean="0">
-                <a:solidFill>
-                  <a:schemeClr val="tx1"/>
-                </a:solidFill>
-                <a:effectLst/>
-                <a:latin typeface="+mn-lt"/>
-                <a:ea typeface="+mn-ea"/>
-                <a:cs typeface="+mn-cs"/>
-                <a:hlinkClick r:id="rId3" tooltip="Sparse graph"/>
-              </a:rPr>
-              <a:t>sparse graphs</a:t>
-            </a:r>
-            <a:r>
-              <a:rPr lang="en-US" sz="1200" b="0" i="0" kern="1200" dirty="0" smtClean="0">
-                <a:solidFill>
-                  <a:schemeClr val="tx1"/>
-                </a:solidFill>
-                <a:effectLst/>
-                <a:latin typeface="+mn-lt"/>
-                <a:ea typeface="+mn-ea"/>
-                <a:cs typeface="+mn-cs"/>
-              </a:rPr>
-              <a:t>. An adjacency matrix is preferred if the graph is dense, that is the number of edges |</a:t>
-            </a:r>
-            <a:r>
-              <a:rPr lang="en-US" sz="1200" b="0" i="1" kern="1200" dirty="0" smtClean="0">
-                <a:solidFill>
-                  <a:schemeClr val="tx1"/>
-                </a:solidFill>
-                <a:effectLst/>
-                <a:latin typeface="+mn-lt"/>
-                <a:ea typeface="+mn-ea"/>
-                <a:cs typeface="+mn-cs"/>
-              </a:rPr>
-              <a:t>E</a:t>
-            </a:r>
-            <a:r>
-              <a:rPr lang="en-US" sz="1200" b="0" i="0" kern="1200" dirty="0" smtClean="0">
-                <a:solidFill>
-                  <a:schemeClr val="tx1"/>
-                </a:solidFill>
-                <a:effectLst/>
-                <a:latin typeface="+mn-lt"/>
-                <a:ea typeface="+mn-ea"/>
-                <a:cs typeface="+mn-cs"/>
-              </a:rPr>
-              <a:t>| is close to the number of vertices squared, |</a:t>
-            </a:r>
-            <a:r>
-              <a:rPr lang="en-US" sz="1200" b="0" i="1" kern="1200" dirty="0" smtClean="0">
-                <a:solidFill>
-                  <a:schemeClr val="tx1"/>
-                </a:solidFill>
-                <a:effectLst/>
-                <a:latin typeface="+mn-lt"/>
-                <a:ea typeface="+mn-ea"/>
-                <a:cs typeface="+mn-cs"/>
-              </a:rPr>
-              <a:t>V</a:t>
-            </a:r>
-            <a:r>
-              <a:rPr lang="en-US" sz="1200" b="0" i="0" kern="1200" dirty="0" smtClean="0">
-                <a:solidFill>
-                  <a:schemeClr val="tx1"/>
-                </a:solidFill>
-                <a:effectLst/>
-                <a:latin typeface="+mn-lt"/>
-                <a:ea typeface="+mn-ea"/>
-                <a:cs typeface="+mn-cs"/>
-              </a:rPr>
-              <a:t>|</a:t>
-            </a:r>
-            <a:r>
-              <a:rPr lang="en-US" sz="1200" b="0" i="0" kern="1200" baseline="30000" dirty="0" smtClean="0">
-                <a:solidFill>
-                  <a:schemeClr val="tx1"/>
-                </a:solidFill>
-                <a:effectLst/>
-                <a:latin typeface="+mn-lt"/>
-                <a:ea typeface="+mn-ea"/>
-                <a:cs typeface="+mn-cs"/>
-              </a:rPr>
-              <a:t>2</a:t>
-            </a:r>
-            <a:r>
-              <a:rPr lang="en-US" sz="1200" b="0" i="0" kern="1200" dirty="0" smtClean="0">
-                <a:solidFill>
-                  <a:schemeClr val="tx1"/>
-                </a:solidFill>
-                <a:effectLst/>
-                <a:latin typeface="+mn-lt"/>
-                <a:ea typeface="+mn-ea"/>
-                <a:cs typeface="+mn-cs"/>
-              </a:rPr>
-              <a:t>, or if one must be able to quickly look up if there is an edge connecting two vertices.</a:t>
+              <a:rPr lang="en-US" dirty="0" smtClean="0"/>
+              <a:t>Graphs can be used to model many types of relations and processes in physical, biological, social and information systems. Many practical problems can be represented by graphs.</a:t>
+            </a:r>
+          </a:p>
+          <a:p>
+            <a:r>
+              <a:rPr lang="en-US" dirty="0" smtClean="0"/>
+              <a:t>In computer science, graphs are used to represent networks of communication, data organization, computational devices, the flow of computation, etc. For instance, the link structure of a website can be represented by a directed graph, in which the vertices represent web pages and directed edges represent links from one page to another. A similar approach can be taken to problems in travel, biology, computer chip design, and many other fields. The development of algorithms to handle graphs is therefore of major interest in computer science.</a:t>
             </a:r>
             <a:endParaRPr lang="en-GB" dirty="0"/>
           </a:p>
@@ -782,7 +673,7 @@
           <a:p>
             <a:fld id="{29573B9A-66FB-4A63-BCD5-E140B9429FD2}" type="slidenum">
               <a:rPr lang="en-GB" smtClean="0"/>
-              <a:t>10</a:t>
+              <a:t>4</a:t>
             </a:fld>
             <a:endParaRPr lang="en-GB"/>
           </a:p>
@@ -791,7 +682,7 @@
     </p:spTree>
     <p:extLst>
       <p:ext uri="{BB962C8B-B14F-4D97-AF65-F5344CB8AC3E}">
-        <p14:creationId xmlns:p14="http://schemas.microsoft.com/office/powerpoint/2010/main" val="1825996693"/>
+        <p14:creationId xmlns:p14="http://schemas.microsoft.com/office/powerpoint/2010/main" val="343859629"/>
       </p:ext>
     </p:extLst>
   </p:cSld>
@@ -845,6 +736,115 @@
           <a:bodyPr/>
           <a:lstStyle/>
           <a:p>
+            <a:r>
+              <a:rPr lang="en-US" sz="1200" b="0" i="0" kern="1200" dirty="0" smtClean="0">
+                <a:solidFill>
+                  <a:schemeClr val="tx1"/>
+                </a:solidFill>
+                <a:effectLst/>
+                <a:latin typeface="+mn-lt"/>
+                <a:ea typeface="+mn-ea"/>
+                <a:cs typeface="+mn-cs"/>
+              </a:rPr>
+              <a:t>Adjacency lists are generally preferred because they efficiently represent </a:t>
+            </a:r>
+            <a:r>
+              <a:rPr lang="en-US" sz="1200" b="0" i="0" u="none" strike="noStrike" kern="1200" dirty="0" smtClean="0">
+                <a:solidFill>
+                  <a:schemeClr val="tx1"/>
+                </a:solidFill>
+                <a:effectLst/>
+                <a:latin typeface="+mn-lt"/>
+                <a:ea typeface="+mn-ea"/>
+                <a:cs typeface="+mn-cs"/>
+                <a:hlinkClick r:id="rId3" tooltip="Sparse graph"/>
+              </a:rPr>
+              <a:t>sparse graphs</a:t>
+            </a:r>
+            <a:r>
+              <a:rPr lang="en-US" sz="1200" b="0" i="0" kern="1200" dirty="0" smtClean="0">
+                <a:solidFill>
+                  <a:schemeClr val="tx1"/>
+                </a:solidFill>
+                <a:effectLst/>
+                <a:latin typeface="+mn-lt"/>
+                <a:ea typeface="+mn-ea"/>
+                <a:cs typeface="+mn-cs"/>
+              </a:rPr>
+              <a:t>. An adjacency matrix is preferred if the graph is dense, that is the number of edges |</a:t>
+            </a:r>
+            <a:r>
+              <a:rPr lang="en-US" sz="1200" b="0" i="1" kern="1200" dirty="0" smtClean="0">
+                <a:solidFill>
+                  <a:schemeClr val="tx1"/>
+                </a:solidFill>
+                <a:effectLst/>
+                <a:latin typeface="+mn-lt"/>
+                <a:ea typeface="+mn-ea"/>
+                <a:cs typeface="+mn-cs"/>
+              </a:rPr>
+              <a:t>E</a:t>
+            </a:r>
+            <a:r>
+              <a:rPr lang="en-US" sz="1200" b="0" i="0" kern="1200" dirty="0" smtClean="0">
+                <a:solidFill>
+                  <a:schemeClr val="tx1"/>
+                </a:solidFill>
+                <a:effectLst/>
+                <a:latin typeface="+mn-lt"/>
+                <a:ea typeface="+mn-ea"/>
+                <a:cs typeface="+mn-cs"/>
+              </a:rPr>
+              <a:t>| is close to the number of vertices squared, |</a:t>
+            </a:r>
+            <a:r>
+              <a:rPr lang="en-US" sz="1200" b="0" i="1" kern="1200" dirty="0" smtClean="0">
+                <a:solidFill>
+                  <a:schemeClr val="tx1"/>
+                </a:solidFill>
+                <a:effectLst/>
+                <a:latin typeface="+mn-lt"/>
+                <a:ea typeface="+mn-ea"/>
+                <a:cs typeface="+mn-cs"/>
+              </a:rPr>
+              <a:t>V</a:t>
+            </a:r>
+            <a:r>
+              <a:rPr lang="en-US" sz="1200" b="0" i="0" kern="1200" dirty="0" smtClean="0">
+                <a:solidFill>
+                  <a:schemeClr val="tx1"/>
+                </a:solidFill>
+                <a:effectLst/>
+                <a:latin typeface="+mn-lt"/>
+                <a:ea typeface="+mn-ea"/>
+                <a:cs typeface="+mn-cs"/>
+              </a:rPr>
+              <a:t>|</a:t>
+            </a:r>
+            <a:r>
+              <a:rPr lang="en-US" sz="1200" b="0" i="0" kern="1200" baseline="30000" dirty="0" smtClean="0">
+                <a:solidFill>
+                  <a:schemeClr val="tx1"/>
+                </a:solidFill>
+                <a:effectLst/>
+                <a:latin typeface="+mn-lt"/>
+                <a:ea typeface="+mn-ea"/>
+                <a:cs typeface="+mn-cs"/>
+              </a:rPr>
+              <a:t>2</a:t>
+            </a:r>
+            <a:r>
+              <a:rPr lang="en-US" sz="1200" b="0" i="0" kern="1200" dirty="0" smtClean="0">
+                <a:solidFill>
+                  <a:schemeClr val="tx1"/>
+                </a:solidFill>
+                <a:effectLst/>
+                <a:latin typeface="+mn-lt"/>
+                <a:ea typeface="+mn-ea"/>
+                <a:cs typeface="+mn-cs"/>
+              </a:rPr>
+              <a:t>, or if one must be able to quickly look up if there is an edge connecting two vertices.</a:t>
+            </a:r>
             <a:endParaRPr lang="en-GB" dirty="0"/>
           </a:p>
         </p:txBody>
@@ -866,7 +866,7 @@
           <a:p>
             <a:fld id="{29573B9A-66FB-4A63-BCD5-E140B9429FD2}" type="slidenum">
               <a:rPr lang="en-GB" smtClean="0"/>
-              <a:t>11</a:t>
+              <a:t>10</a:t>
             </a:fld>
             <a:endParaRPr lang="en-GB"/>
           </a:p>
@@ -875,7 +875,7 @@
     </p:spTree>
     <p:extLst>
       <p:ext uri="{BB962C8B-B14F-4D97-AF65-F5344CB8AC3E}">
-        <p14:creationId xmlns:p14="http://schemas.microsoft.com/office/powerpoint/2010/main" val="886204481"/>
+        <p14:creationId xmlns:p14="http://schemas.microsoft.com/office/powerpoint/2010/main" val="1825996693"/>
       </p:ext>
     </p:extLst>
   </p:cSld>
@@ -929,28 +929,6 @@
           <a:bodyPr/>
           <a:lstStyle/>
           <a:p>
-            <a:pPr lvl="1"/>
-            <a:r>
-              <a:rPr lang="pt-BR" dirty="0" smtClean="0"/>
-              <a:t>Queue:</a:t>
-            </a:r>
-            <a:r>
-              <a:rPr lang="pt-BR" baseline="0" dirty="0" smtClean="0"/>
-              <a:t> </a:t>
-            </a:r>
-            <a:r>
-              <a:rPr lang="pt-BR" dirty="0" smtClean="0"/>
-              <a:t>A </a:t>
-            </a:r>
-            <a:r>
-              <a:rPr lang="pt-BR" dirty="0" smtClean="0">
-                <a:sym typeface="Wingdings" panose="05000000000000000000" pitchFamily="2" charset="2"/>
-              </a:rPr>
-              <a:t> B, E  E, C, F  F, D, G  D, G  G</a:t>
-            </a:r>
-            <a:endParaRPr lang="en-GB" dirty="0" smtClean="0"/>
-          </a:p>
-          <a:p>
             <a:endParaRPr lang="en-GB" dirty="0"/>
           </a:p>
         </p:txBody>
@@ -972,7 +950,7 @@
           <a:p>
             <a:fld id="{29573B9A-66FB-4A63-BCD5-E140B9429FD2}" type="slidenum">
               <a:rPr lang="en-GB" smtClean="0"/>
-              <a:t>22</a:t>
+              <a:t>11</a:t>
             </a:fld>
             <a:endParaRPr lang="en-GB"/>
           </a:p>
@@ -981,7 +959,7 @@
     </p:spTree>
     <p:extLst>
       <p:ext uri="{BB962C8B-B14F-4D97-AF65-F5344CB8AC3E}">
-        <p14:creationId xmlns:p14="http://schemas.microsoft.com/office/powerpoint/2010/main" val="1543662766"/>
+        <p14:creationId xmlns:p14="http://schemas.microsoft.com/office/powerpoint/2010/main" val="886204481"/>
       </p:ext>
     </p:extLst>
   </p:cSld>
@@ -1035,6 +1013,112 @@
           <a:bodyPr/>
           <a:lstStyle/>
           <a:p>
+            <a:pPr lvl="1"/>
+            <a:r>
+              <a:rPr lang="pt-BR" dirty="0" smtClean="0"/>
+              <a:t>Queue:</a:t>
+            </a:r>
+            <a:r>
+              <a:rPr lang="pt-BR" baseline="0" dirty="0" smtClean="0"/>
+              <a:t> </a:t>
+            </a:r>
+            <a:r>
+              <a:rPr lang="pt-BR" dirty="0" smtClean="0"/>
+              <a:t>A </a:t>
+            </a:r>
+            <a:r>
+              <a:rPr lang="pt-BR" dirty="0" smtClean="0">
+                <a:sym typeface="Wingdings" panose="05000000000000000000" pitchFamily="2" charset="2"/>
+              </a:rPr>
+              <a:t> B, E  E, C, F  F, D, G  D, G  G</a:t>
+            </a:r>
+            <a:endParaRPr lang="en-GB" dirty="0" smtClean="0"/>
+          </a:p>
+          <a:p>
+            <a:endParaRPr lang="en-GB" dirty="0"/>
+          </a:p>
+        </p:txBody>
+      </p:sp>
+      <p:sp>
+        <p:nvSpPr>
+          <p:cNvPr id="4" name="Slide Number Placeholder 3"/>
+          <p:cNvSpPr>
+            <a:spLocks noGrp="1"/>
+          </p:cNvSpPr>
+          <p:nvPr>
+            <p:ph type="sldNum" sz="quarter" idx="10"/>
+          </p:nvPr>
+        </p:nvSpPr>
+        <p:spPr/>
+        <p:txBody>
+          <a:bodyPr/>
+          <a:lstStyle/>
+          <a:p>
+            <a:fld id="{29573B9A-66FB-4A63-BCD5-E140B9429FD2}" type="slidenum">
+              <a:rPr lang="en-GB" smtClean="0"/>
+              <a:t>22</a:t>
+            </a:fld>
+            <a:endParaRPr lang="en-GB"/>
+          </a:p>
+        </p:txBody>
+      </p:sp>
+    </p:spTree>
+    <p:extLst>
+      <p:ext uri="{BB962C8B-B14F-4D97-AF65-F5344CB8AC3E}">
+        <p14:creationId xmlns:p14="http://schemas.microsoft.com/office/powerpoint/2010/main" val="1543662766"/>
+      </p:ext>
+    </p:extLst>
+  </p:cSld>
+  <p:clrMapOvr>
+    <a:masterClrMapping/>
+  </p:clrMapOvr>
+</p:notes>
+</file>
+
+<file path=ppt/notesSlides/notesSlide6.xml><?xml version="1.0" encoding="utf-8"?>
+<p:notes xmlns:a="http://schemas.openxmlformats.org/drawingml/2006/main" xmlns:r="http://schemas.openxmlformats.org/officeDocument/2006/relationships" xmlns:p="http://schemas.openxmlformats.org/presentationml/2006/main">
+  <p:cSld>
+    <p:spTree>
+      <p:nvGrpSpPr>
+        <p:cNvPr id="1" name=""/>
+        <p:cNvGrpSpPr/>
+        <p:nvPr/>
+      </p:nvGrpSpPr>
+      <p:grpSpPr>
+        <a:xfrm>
+          <a:off x="0" y="0"/>
+          <a:ext cx="0" cy="0"/>
+          <a:chOff x="0" y="0"/>
+          <a:chExt cx="0" cy="0"/>
+        </a:xfrm>
+      </p:grpSpPr>
+      <p:sp>
+        <p:nvSpPr>
+          <p:cNvPr id="2" name="Slide Image Placeholder 1"/>
+          <p:cNvSpPr>
+            <a:spLocks noGrp="1" noRot="1" noChangeAspect="1"/>
+          </p:cNvSpPr>
+          <p:nvPr>
+            <p:ph type="sldImg"/>
+          </p:nvPr>
+        </p:nvSpPr>
+        <p:spPr/>
+      </p:sp>
+      <p:sp>
+        <p:nvSpPr>
+          <p:cNvPr id="3" name="Notes Placeholder 2"/>
+          <p:cNvSpPr>
+            <a:spLocks noGrp="1"/>
+          </p:cNvSpPr>
+          <p:nvPr>
+            <p:ph type="body" idx="1"/>
+          </p:nvPr>
+        </p:nvSpPr>
+        <p:spPr/>
+        <p:txBody>
+          <a:bodyPr/>
+          <a:lstStyle/>
+          <a:p>
             <a:r>
               <a:rPr lang="en-GB" dirty="0" smtClean="0"/>
               <a:t>Stack: A </a:t>
@@ -1187,7 +1271,7 @@
 </p:notes>
 </file>
 
-<file path=ppt/notesSlides/notesSlide6.xml><?xml version="1.0" encoding="utf-8"?>
+<file path=ppt/notesSlides/notesSlide7.xml><?xml version="1.0" encoding="utf-8"?>
 <p:notes xmlns:a="http://schemas.openxmlformats.org/drawingml/2006/main" xmlns:r="http://schemas.openxmlformats.org/officeDocument/2006/relationships" xmlns:p="http://schemas.openxmlformats.org/presentationml/2006/main">
   <p:cSld>
     <p:spTree>
@@ -2250,7 +2334,7 @@
           <a:bodyPr/>
           <a:lstStyle/>
           <a:p>
-            <a:fld id="{11454AF2-527D-4AE4-85B2-1BB7775857A5}" type="datetime1">
+            <a:fld id="{6D0056B2-4F08-4129-BC21-E4EE9138FBBD}" type="datetime1">
               <a:rPr lang="en-GB" smtClean="0"/>
               <a:t>11/12/2015</a:t>
             </a:fld>
@@ -2274,8 +2358,8 @@
           <a:lstStyle/>
           <a:p>
             <a:r>
-              <a:rPr lang="en-GB" smtClean="0"/>
-              <a:t>INFDEV016A - G. Costantini</a:t>
+              <a:rPr lang="it-IT" smtClean="0"/>
+              <a:t>INFDEV026A - G. Costantini, F. Di Giacomo, G. Maggiore</a:t>
             </a:r>
             <a:endParaRPr lang="en-GB"/>
           </a:p>
@@ -2505,7 +2589,7 @@
           <a:bodyPr/>
           <a:lstStyle/>
           <a:p>
-            <a:fld id="{90D1BFF2-D93D-4705-BB24-381E17BEC669}" type="datetime1">
+            <a:fld id="{612D572C-2764-414E-9C89-DDD42C6B07C1}" type="datetime1">
               <a:rPr lang="en-GB" smtClean="0"/>
               <a:t>11/12/2015</a:t>
             </a:fld>
@@ -2529,8 +2613,8 @@
           <a:lstStyle/>
           <a:p>
             <a:r>
-              <a:rPr lang="en-GB" smtClean="0"/>
-              <a:t>INFDEV016A - G. Costantini</a:t>
+              <a:rPr lang="it-IT" smtClean="0"/>
+              <a:t>INFDEV026A - G. Costantini, F. Di Giacomo, G. Maggiore</a:t>
             </a:r>
             <a:endParaRPr lang="en-GB"/>
           </a:p>
@@ -2823,7 +2907,7 @@
           <a:bodyPr/>
           <a:lstStyle/>
           <a:p>
-            <a:fld id="{6ADEBE88-D816-43DC-B24C-D499F6F5A8A8}" type="datetime1">
+            <a:fld id="{2F9DEDFE-25E5-4177-B37C-03C25AABCBD5}" type="datetime1">
               <a:rPr lang="en-GB" smtClean="0"/>
               <a:t>11/12/2015</a:t>
             </a:fld>
@@ -2847,8 +2931,8 @@
           <a:lstStyle/>
           <a:p>
             <a:r>
-              <a:rPr lang="en-GB" smtClean="0"/>
-              <a:t>INFDEV016A - G. Costantini</a:t>
+              <a:rPr lang="it-IT" smtClean="0"/>
+              <a:t>INFDEV026A - G. Costantini, F. Di Giacomo, G. Maggiore</a:t>
             </a:r>
             <a:endParaRPr lang="en-GB"/>
           </a:p>
@@ -3154,7 +3238,7 @@
           <a:bodyPr/>
           <a:lstStyle/>
           <a:p>
-            <a:fld id="{6A0DEC89-426A-453B-BF48-D00FC50BEFFE}" type="datetime1">
+            <a:fld id="{09077836-4222-4E87-A3F7-BF9743D61C38}" type="datetime1">
               <a:rPr lang="en-GB" smtClean="0"/>
               <a:t>11/12/2015</a:t>
             </a:fld>
@@ -3178,8 +3262,8 @@
           <a:lstStyle/>
           <a:p>
             <a:r>
-              <a:rPr lang="en-GB" smtClean="0"/>
-              <a:t>INFDEV016A - G. Costantini</a:t>
+              <a:rPr lang="it-IT" smtClean="0"/>
+              <a:t>INFDEV026A - G. Costantini, F. Di Giacomo, G. Maggiore</a:t>
             </a:r>
             <a:endParaRPr lang="en-GB"/>
           </a:p>
@@ -3472,7 +3556,7 @@
           <a:bodyPr/>
           <a:lstStyle/>
           <a:p>
-            <a:fld id="{4FBB1A60-197C-49F7-86A3-1630494D3B8D}" type="datetime1">
+            <a:fld id="{5982107C-A272-44F7-BB13-558FCEBC42B2}" type="datetime1">
               <a:rPr lang="en-GB" smtClean="0"/>
               <a:t>11/12/2015</a:t>
             </a:fld>
@@ -3496,8 +3580,8 @@
           <a:lstStyle/>
           <a:p>
             <a:r>
-              <a:rPr lang="en-GB" smtClean="0"/>
-              <a:t>INFDEV016A - G. Costantini</a:t>
+              <a:rPr lang="it-IT" smtClean="0"/>
+              <a:t>INFDEV026A - G. Costantini, F. Di Giacomo, G. Maggiore</a:t>
             </a:r>
             <a:endParaRPr lang="en-GB"/>
           </a:p>
@@ -3863,7 +3947,7 @@
           <a:bodyPr/>
           <a:lstStyle/>
           <a:p>
-            <a:fld id="{A34DB7B1-D3B3-42B9-91F1-D4323E10C1C2}" type="datetime1">
+            <a:fld id="{F9658BBA-9690-4900-AE7A-80E9850FB3EA}" type="datetime1">
               <a:rPr lang="en-GB" smtClean="0"/>
               <a:t>11/12/2015</a:t>
             </a:fld>
@@ -3887,8 +3971,8 @@
           <a:lstStyle/>
           <a:p>
             <a:r>
-              <a:rPr lang="en-GB" smtClean="0"/>
-              <a:t>INFDEV016A - G. Costantini</a:t>
+              <a:rPr lang="it-IT" smtClean="0"/>
+              <a:t>INFDEV026A - G. Costantini, F. Di Giacomo, G. Maggiore</a:t>
             </a:r>
             <a:endParaRPr lang="en-GB"/>
           </a:p>
@@ -4037,7 +4121,7 @@
           <a:bodyPr/>
           <a:lstStyle/>
           <a:p>
-            <a:fld id="{408E3BDF-4569-4721-A571-85E0DC35557A}" type="datetime1">
+            <a:fld id="{BEB6CA79-FB04-4AE1-90FD-D2D3D2AAEEC1}" type="datetime1">
               <a:rPr lang="en-GB" smtClean="0"/>
               <a:t>11/12/2015</a:t>
             </a:fld>
@@ -4061,8 +4145,8 @@
           <a:lstStyle/>
           <a:p>
             <a:r>
-              <a:rPr lang="en-GB" smtClean="0"/>
-              <a:t>INFDEV016A - G. Costantini</a:t>
+              <a:rPr lang="it-IT" smtClean="0"/>
+              <a:t>INFDEV026A - G. Costantini, F. Di Giacomo, G. Maggiore</a:t>
             </a:r>
             <a:endParaRPr lang="en-GB"/>
           </a:p>
@@ -4221,7 +4305,7 @@
           <a:bodyPr/>
           <a:lstStyle/>
           <a:p>
-            <a:fld id="{B3700E23-83ED-4F6C-AD55-95D6B0EB9300}" type="datetime1">
+            <a:fld id="{6C950542-9F3C-4D20-A3AE-6E02D3EC84EE}" type="datetime1">
               <a:rPr lang="en-GB" smtClean="0"/>
               <a:t>11/12/2015</a:t>
             </a:fld>
@@ -4245,8 +4329,8 @@
           <a:lstStyle/>
           <a:p>
             <a:r>
-              <a:rPr lang="en-GB" smtClean="0"/>
-              <a:t>INFDEV016A - G. Costantini</a:t>
+              <a:rPr lang="it-IT" smtClean="0"/>
+              <a:t>INFDEV026A - G. Costantini, F. Di Giacomo, G. Maggiore</a:t>
             </a:r>
             <a:endParaRPr lang="en-GB"/>
           </a:p>
@@ -4395,7 +4479,7 @@
           <a:bodyPr/>
           <a:lstStyle/>
           <a:p>
-            <a:fld id="{216B2DEC-5C6E-4491-BF0B-EA498D4E9FCB}" type="datetime1">
+            <a:fld id="{F58B147D-FA68-4708-8C51-0F326ACB9AAA}" type="datetime1">
               <a:rPr lang="en-GB" smtClean="0"/>
               <a:t>11/12/2015</a:t>
             </a:fld>
@@ -4419,8 +4503,8 @@
           <a:lstStyle/>
           <a:p>
             <a:r>
-              <a:rPr lang="en-GB" smtClean="0"/>
-              <a:t>INFDEV016A - G. Costantini</a:t>
+              <a:rPr lang="it-IT" smtClean="0"/>
+              <a:t>INFDEV026A - G. Costantini, F. Di Giacomo, G. Maggiore</a:t>
             </a:r>
             <a:endParaRPr lang="en-GB"/>
           </a:p>
@@ -4646,7 +4730,7 @@
           <a:bodyPr/>
           <a:lstStyle/>
           <a:p>
-            <a:fld id="{CD45C92C-2104-4A5A-B598-D894566A56F4}" type="datetime1">
+            <a:fld id="{0075BD33-8D5F-4D67-8F67-B28D0B7F2F08}" type="datetime1">
               <a:rPr lang="en-GB" smtClean="0"/>
               <a:t>11/12/2015</a:t>
             </a:fld>
@@ -4670,8 +4754,8 @@
           <a:lstStyle/>
           <a:p>
             <a:r>
-              <a:rPr lang="en-GB" smtClean="0"/>
-              <a:t>INFDEV016A - G. Costantini</a:t>
+              <a:rPr lang="it-IT" smtClean="0"/>
+              <a:t>INFDEV026A - G. Costantini, F. Di Giacomo, G. Maggiore</a:t>
             </a:r>
             <a:endParaRPr lang="en-GB"/>
           </a:p>
@@ -4882,7 +4966,7 @@
           <a:bodyPr/>
           <a:lstStyle/>
           <a:p>
-            <a:fld id="{01AE1153-50C2-4CE9-B5EE-3973A16B6CEF}" type="datetime1">
+            <a:fld id="{633BF77B-1C97-4E77-BD1D-75274F40FC5B}" type="datetime1">
               <a:rPr lang="en-GB" smtClean="0"/>
               <a:t>11/12/2015</a:t>
             </a:fld>
@@ -4906,8 +4990,8 @@
           <a:lstStyle/>
           <a:p>
             <a:r>
-              <a:rPr lang="en-GB" smtClean="0"/>
-              <a:t>INFDEV016A - G. Costantini</a:t>
+              <a:rPr lang="it-IT" smtClean="0"/>
+              <a:t>INFDEV026A - G. Costantini, F. Di Giacomo, G. Maggiore</a:t>
             </a:r>
             <a:endParaRPr lang="en-GB"/>
           </a:p>
@@ -5260,7 +5344,7 @@
           <a:bodyPr/>
           <a:lstStyle/>
           <a:p>
-            <a:fld id="{3ADCC159-C55D-45DC-B4A3-6C33D45AE7CE}" type="datetime1">
+            <a:fld id="{5153D374-1A43-4F28-8430-6675858FE949}" type="datetime1">
               <a:rPr lang="en-GB" smtClean="0"/>
               <a:t>11/12/2015</a:t>
             </a:fld>
@@ -5284,8 +5368,8 @@
           <a:lstStyle/>
           <a:p>
             <a:r>
-              <a:rPr lang="en-GB" smtClean="0"/>
-              <a:t>INFDEV016A - G. Costantini</a:t>
+              <a:rPr lang="it-IT" smtClean="0"/>
+              <a:t>INFDEV026A - G. Costantini, F. Di Giacomo, G. Maggiore</a:t>
             </a:r>
             <a:endParaRPr lang="en-GB"/>
           </a:p>
@@ -5387,7 +5471,7 @@
           <a:bodyPr/>
           <a:lstStyle/>
           <a:p>
-            <a:fld id="{E352AA4B-68A4-46D1-86A0-5E3C4D6303F7}" type="datetime1">
+            <a:fld id="{BA88CCDF-626B-4668-97DC-5A1BBEAB0A11}" type="datetime1">
               <a:rPr lang="en-GB" smtClean="0"/>
               <a:t>11/12/2015</a:t>
             </a:fld>
@@ -5411,8 +5495,8 @@
           <a:lstStyle/>
           <a:p>
             <a:r>
-              <a:rPr lang="en-GB" smtClean="0"/>
-              <a:t>INFDEV016A - G. Costantini</a:t>
+              <a:rPr lang="it-IT" smtClean="0"/>
+              <a:t>INFDEV026A - G. Costantini, F. Di Giacomo, G. Maggiore</a:t>
             </a:r>
             <a:endParaRPr lang="en-GB"/>
           </a:p>
@@ -5486,7 +5570,7 @@
           <a:bodyPr/>
           <a:lstStyle/>
           <a:p>
-            <a:fld id="{92755FB0-C62B-49ED-A7A5-5C4BA752E292}" type="datetime1">
+            <a:fld id="{9760674D-D2B9-4AE0-923F-2202F9433AF2}" type="datetime1">
               <a:rPr lang="en-GB" smtClean="0"/>
               <a:t>11/12/2015</a:t>
             </a:fld>
@@ -5510,8 +5594,8 @@
           <a:lstStyle/>
           <a:p>
             <a:r>
-              <a:rPr lang="en-GB" smtClean="0"/>
-              <a:t>INFDEV016A - G. Costantini</a:t>
+              <a:rPr lang="it-IT" smtClean="0"/>
+              <a:t>INFDEV026A - G. Costantini, F. Di Giacomo, G. Maggiore</a:t>
             </a:r>
             <a:endParaRPr lang="en-GB"/>
           </a:p>
@@ -5745,7 +5829,7 @@
           <a:bodyPr/>
           <a:lstStyle/>
           <a:p>
-            <a:fld id="{D20661DD-CC26-4A5A-9ABC-DEA77C0EC715}" type="datetime1">
+            <a:fld id="{319B5FBB-5ECE-4C54-9CCE-31F728E781A0}" type="datetime1">
               <a:rPr lang="en-GB" smtClean="0"/>
               <a:t>11/12/2015</a:t>
             </a:fld>
@@ -5769,8 +5853,8 @@
           <a:lstStyle/>
           <a:p>
             <a:r>
-              <a:rPr lang="en-GB" smtClean="0"/>
-              <a:t>INFDEV016A - G. Costantini</a:t>
+              <a:rPr lang="it-IT" smtClean="0"/>
+              <a:t>INFDEV026A - G. Costantini, F. Di Giacomo, G. Maggiore</a:t>
             </a:r>
             <a:endParaRPr lang="en-GB"/>
           </a:p>
@@ -6012,7 +6096,7 @@
           <a:bodyPr/>
           <a:lstStyle/>
           <a:p>
-            <a:fld id="{69FECE05-9CEC-46F9-A226-9CCAD8202D75}" type="datetime1">
+            <a:fld id="{73C6F11D-3D21-4E28-9384-DA37B819A935}" type="datetime1">
               <a:rPr lang="en-GB" smtClean="0"/>
               <a:t>11/12/2015</a:t>
             </a:fld>
@@ -6036,8 +6120,8 @@
           <a:lstStyle/>
           <a:p>
             <a:r>
-              <a:rPr lang="en-GB" smtClean="0"/>
-              <a:t>INFDEV016A - G. Costantini</a:t>
+              <a:rPr lang="it-IT" smtClean="0"/>
+              <a:t>INFDEV026A - G. Costantini, F. Di Giacomo, G. Maggiore</a:t>
             </a:r>
             <a:endParaRPr lang="en-GB"/>
           </a:p>
@@ -6761,7 +6845,7 @@
             </a:lvl1pPr>
           </a:lstStyle>
           <a:p>
-            <a:fld id="{4FC71C82-A776-48E4-B6F4-195D61CBF8AF}" type="datetime1">
+            <a:fld id="{89F71666-4645-43A7-8D49-9FF37F68D6E1}" type="datetime1">
               <a:rPr lang="en-GB" smtClean="0"/>
               <a:t>11/12/2015</a:t>
             </a:fld>
@@ -6803,8 +6887,8 @@
           </a:lstStyle>
           <a:p>
             <a:r>
-              <a:rPr lang="en-GB" smtClean="0"/>
-              <a:t>INFDEV016A - G. Costantini</a:t>
+              <a:rPr lang="it-IT" smtClean="0"/>
+              <a:t>INFDEV026A - G. Costantini, F. Di Giacomo, G. Maggiore</a:t>
             </a:r>
             <a:endParaRPr lang="en-GB"/>
           </a:p>
@@ -7477,8 +7561,8 @@
           </a:p>
         </p:txBody>
       </p:sp>
-      <mc:AlternateContent xmlns:mc="http://schemas.openxmlformats.org/markup-compatibility/2006">
-        <mc:Choice xmlns:a14="http://schemas.microsoft.com/office/drawing/2010/main" Requires="a14">
+      <mc:AlternateContent xmlns:mc="http://schemas.openxmlformats.org/markup-compatibility/2006" xmlns:a14="http://schemas.microsoft.com/office/drawing/2010/main">
+        <mc:Choice Requires="a14">
           <p:sp>
             <p:nvSpPr>
               <p:cNvPr id="3" name="Content Placeholder 2"/>
@@ -7708,12 +7792,11 @@
                   <a:rPr lang="en-US" dirty="0" smtClean="0"/>
                   <a:t>When the graph is sparse (= few edges), adjacency lists are more efficient</a:t>
                 </a:r>
-                <a:endParaRPr lang="en-US" dirty="0" smtClean="0"/>
               </a:p>
             </p:txBody>
           </p:sp>
         </mc:Choice>
-        <mc:Fallback>
+        <mc:Fallback xmlns="">
           <p:sp>
             <p:nvSpPr>
               <p:cNvPr id="3" name="Content Placeholder 2"/>
@@ -7763,8 +7846,8 @@
           <a:lstStyle/>
           <a:p>
             <a:r>
-              <a:rPr lang="en-GB" smtClean="0"/>
-              <a:t>INFDEV016A - G. Costantini</a:t>
+              <a:rPr lang="it-IT" smtClean="0"/>
+              <a:t>INFDEV026A - G. Costantini, F. Di Giacomo, G. Maggiore</a:t>
             </a:r>
             <a:endParaRPr lang="en-GB"/>
           </a:p>
@@ -8061,8 +8144,8 @@
           <a:lstStyle/>
           <a:p>
             <a:r>
-              <a:rPr lang="en-GB" smtClean="0"/>
-              <a:t>INFDEV016A - G. Costantini</a:t>
+              <a:rPr lang="it-IT" smtClean="0"/>
+              <a:t>INFDEV026A - G. Costantini, F. Di Giacomo, G. Maggiore</a:t>
             </a:r>
             <a:endParaRPr lang="en-GB"/>
           </a:p>
@@ -8268,18 +8351,14 @@
           <a:p>
             <a:r>
               <a:rPr lang="en-GB" dirty="0" smtClean="0"/>
-              <a:t>Graphs – </a:t>
-            </a:r>
-            <a:r>
-              <a:rPr lang="en-GB" dirty="0" smtClean="0"/>
-              <a:t>Definition of digraph</a:t>
+              <a:t>Graphs – Definition of digraph</a:t>
             </a:r>
             <a:endParaRPr lang="en-GB" dirty="0"/>
           </a:p>
         </p:txBody>
       </p:sp>
-      <mc:AlternateContent xmlns:mc="http://schemas.openxmlformats.org/markup-compatibility/2006">
-        <mc:Choice xmlns:a14="http://schemas.microsoft.com/office/drawing/2010/main" Requires="a14">
+      <mc:AlternateContent xmlns:mc="http://schemas.openxmlformats.org/markup-compatibility/2006" xmlns:a14="http://schemas.microsoft.com/office/drawing/2010/main">
+        <mc:Choice Requires="a14">
           <p:sp>
             <p:nvSpPr>
               <p:cNvPr id="3" name="Content Placeholder 2"/>
@@ -8474,11 +8553,7 @@
                 <a:pPr lvl="2"/>
                 <a:r>
                   <a:rPr lang="en-US" dirty="0" smtClean="0"/>
-                  <a:t>the </a:t>
-                </a:r>
-                <a:r>
-                  <a:rPr lang="en-US" dirty="0" smtClean="0"/>
-                  <a:t>edge </a:t>
+                  <a:t>the edge </a:t>
                 </a:r>
                 <a14:m>
                   <m:oMath xmlns:m="http://schemas.openxmlformats.org/officeDocument/2006/math">
@@ -8524,7 +8599,6 @@
                   <a:rPr lang="en-US" dirty="0" smtClean="0"/>
                   <a:t> </a:t>
                 </a:r>
-                <a:endParaRPr lang="en-US" dirty="0" smtClean="0"/>
               </a:p>
               <a:p>
                 <a:pPr lvl="2"/>
@@ -8548,11 +8622,7 @@
                 </a:r>
                 <a:r>
                   <a:rPr lang="en-US" i="1" dirty="0" smtClean="0"/>
-                  <a:t>erminates/is </a:t>
-                </a:r>
-                <a:r>
-                  <a:rPr lang="en-US" i="1" dirty="0" smtClean="0"/>
-                  <a:t>incident to</a:t>
+                  <a:t>erminates/is incident to</a:t>
                 </a:r>
                 <a:r>
                   <a:rPr lang="en-US" dirty="0" smtClean="0"/>
@@ -8573,7 +8643,7 @@
             </p:txBody>
           </p:sp>
         </mc:Choice>
-        <mc:Fallback>
+        <mc:Fallback xmlns="">
           <p:sp>
             <p:nvSpPr>
               <p:cNvPr id="3" name="Content Placeholder 2"/>
@@ -8623,8 +8693,8 @@
           <a:lstStyle/>
           <a:p>
             <a:r>
-              <a:rPr lang="en-GB" smtClean="0"/>
-              <a:t>INFDEV016A - G. Costantini</a:t>
+              <a:rPr lang="it-IT" smtClean="0"/>
+              <a:t>INFDEV026A - G. Costantini, F. Di Giacomo, G. Maggiore</a:t>
             </a:r>
             <a:endParaRPr lang="en-GB"/>
           </a:p>
@@ -8708,13 +8778,8 @@
           <a:p>
             <a:r>
               <a:rPr lang="en-GB" dirty="0"/>
-              <a:t>Graphs – </a:t>
-            </a:r>
-            <a:r>
-              <a:rPr lang="en-GB" dirty="0"/>
-              <a:t>Representation of digraphs</a:t>
-            </a:r>
-            <a:endParaRPr lang="en-GB" dirty="0"/>
+              <a:t>Graphs – Representation of digraphs</a:t>
+            </a:r>
           </a:p>
         </p:txBody>
       </p:sp>
@@ -8759,11 +8824,7 @@
             </a:r>
             <a:r>
               <a:rPr lang="en-US" dirty="0" smtClean="0"/>
-              <a:t>graph, </a:t>
-            </a:r>
-            <a:r>
-              <a:rPr lang="en-US" dirty="0" smtClean="0"/>
-              <a:t>store a list containing the </a:t>
+              <a:t>graph, store a list containing the </a:t>
             </a:r>
             <a:r>
               <a:rPr lang="en-US" dirty="0"/>
@@ -8820,8 +8881,8 @@
           <a:lstStyle/>
           <a:p>
             <a:r>
-              <a:rPr lang="en-GB" smtClean="0"/>
-              <a:t>INFDEV016A - G. Costantini</a:t>
+              <a:rPr lang="it-IT" smtClean="0"/>
+              <a:t>INFDEV026A - G. Costantini, F. Di Giacomo, G. Maggiore</a:t>
             </a:r>
             <a:endParaRPr lang="en-GB"/>
           </a:p>
@@ -9138,8 +9199,8 @@
           <a:lstStyle/>
           <a:p>
             <a:r>
-              <a:rPr lang="en-GB" smtClean="0"/>
-              <a:t>INFDEV016A - G. Costantini</a:t>
+              <a:rPr lang="it-IT" smtClean="0"/>
+              <a:t>INFDEV026A - G. Costantini, F. Di Giacomo, G. Maggiore</a:t>
             </a:r>
             <a:endParaRPr lang="en-GB"/>
           </a:p>
@@ -9287,13 +9348,8 @@
           <a:p>
             <a:r>
               <a:rPr lang="en-GB" dirty="0"/>
-              <a:t>Graphs – </a:t>
-            </a:r>
-            <a:r>
-              <a:rPr lang="en-GB" dirty="0"/>
-              <a:t>Representation of digraphs</a:t>
-            </a:r>
-            <a:endParaRPr lang="en-GB" dirty="0"/>
+              <a:t>Graphs – Representation of digraphs</a:t>
+            </a:r>
           </a:p>
         </p:txBody>
       </p:sp>
@@ -9515,8 +9571,8 @@
           <a:lstStyle/>
           <a:p>
             <a:r>
-              <a:rPr lang="en-GB" smtClean="0"/>
-              <a:t>INFDEV016A - G. Costantini</a:t>
+              <a:rPr lang="it-IT" smtClean="0"/>
+              <a:t>INFDEV026A - G. Costantini, F. Di Giacomo, G. Maggiore</a:t>
             </a:r>
             <a:endParaRPr lang="en-GB"/>
           </a:p>
@@ -9720,8 +9776,8 @@
           </a:p>
         </p:txBody>
       </p:sp>
-      <mc:AlternateContent xmlns:mc="http://schemas.openxmlformats.org/markup-compatibility/2006">
-        <mc:Choice xmlns:a14="http://schemas.microsoft.com/office/drawing/2010/main" Requires="a14">
+      <mc:AlternateContent xmlns:mc="http://schemas.openxmlformats.org/markup-compatibility/2006" xmlns:a14="http://schemas.microsoft.com/office/drawing/2010/main">
+        <mc:Choice Requires="a14">
           <p:sp>
             <p:nvSpPr>
               <p:cNvPr id="3" name="Content Placeholder 2"/>
@@ -9774,15 +9830,7 @@
                 <a:pPr lvl="1"/>
                 <a:r>
                   <a:rPr lang="en-GB" dirty="0" smtClean="0"/>
-                  <a:t>Same </a:t>
-                </a:r>
-                <a:r>
-                  <a:rPr lang="en-GB" dirty="0" smtClean="0"/>
-                  <a:t>concept </a:t>
-                </a:r>
-                <a:r>
-                  <a:rPr lang="en-GB" dirty="0" smtClean="0"/>
-                  <a:t>as in undirected graphs </a:t>
+                  <a:t>Same concept as in undirected graphs </a:t>
                 </a:r>
               </a:p>
               <a:p>
@@ -10180,7 +10228,7 @@
             </p:txBody>
           </p:sp>
         </mc:Choice>
-        <mc:Fallback>
+        <mc:Fallback xmlns="">
           <p:sp>
             <p:nvSpPr>
               <p:cNvPr id="3" name="Content Placeholder 2"/>
@@ -10230,8 +10278,8 @@
           <a:lstStyle/>
           <a:p>
             <a:r>
-              <a:rPr lang="en-GB" smtClean="0"/>
-              <a:t>INFDEV016A - G. Costantini</a:t>
+              <a:rPr lang="it-IT" smtClean="0"/>
+              <a:t>INFDEV026A - G. Costantini, F. Di Giacomo, G. Maggiore</a:t>
             </a:r>
             <a:endParaRPr lang="en-GB"/>
           </a:p>
@@ -10323,8 +10371,8 @@
           </a:p>
         </p:txBody>
       </p:sp>
-      <mc:AlternateContent xmlns:mc="http://schemas.openxmlformats.org/markup-compatibility/2006">
-        <mc:Choice xmlns:a14="http://schemas.microsoft.com/office/drawing/2010/main" Requires="a14">
+      <mc:AlternateContent xmlns:mc="http://schemas.openxmlformats.org/markup-compatibility/2006" xmlns:a14="http://schemas.microsoft.com/office/drawing/2010/main">
+        <mc:Choice Requires="a14">
           <p:sp>
             <p:nvSpPr>
               <p:cNvPr id="3" name="Content Placeholder 2"/>
@@ -10482,11 +10530,7 @@
                 </a:r>
                 <a:r>
                   <a:rPr lang="en-US" dirty="0" smtClean="0"/>
-                  <a:t>vertex to each other vertex in a </a:t>
-                </a:r>
-                <a:r>
-                  <a:rPr lang="en-US" dirty="0" smtClean="0"/>
-                  <a:t>(di)graph</a:t>
+                  <a:t>vertex to each other vertex in a (di)graph</a:t>
                 </a:r>
                 <a:endParaRPr lang="en-US" dirty="0"/>
               </a:p>
@@ -10499,7 +10543,7 @@
             </p:txBody>
           </p:sp>
         </mc:Choice>
-        <mc:Fallback>
+        <mc:Fallback xmlns="">
           <p:sp>
             <p:nvSpPr>
               <p:cNvPr id="3" name="Content Placeholder 2"/>
@@ -10549,8 +10593,8 @@
           <a:lstStyle/>
           <a:p>
             <a:r>
-              <a:rPr lang="en-GB" smtClean="0"/>
-              <a:t>INFDEV016A - G. Costantini</a:t>
+              <a:rPr lang="it-IT" smtClean="0"/>
+              <a:t>INFDEV026A - G. Costantini, F. Di Giacomo, G. Maggiore</a:t>
             </a:r>
             <a:endParaRPr lang="en-GB"/>
           </a:p>
@@ -10741,8 +10785,8 @@
           <a:lstStyle/>
           <a:p>
             <a:r>
-              <a:rPr lang="en-GB" smtClean="0"/>
-              <a:t>INFDEV016A - G. Costantini</a:t>
+              <a:rPr lang="it-IT" smtClean="0"/>
+              <a:t>INFDEV026A - G. Costantini, F. Di Giacomo, G. Maggiore</a:t>
             </a:r>
             <a:endParaRPr lang="en-GB"/>
           </a:p>
@@ -11041,8 +11085,8 @@
           <a:lstStyle/>
           <a:p>
             <a:r>
-              <a:rPr lang="en-GB" smtClean="0"/>
-              <a:t>INFDEV016A - G. Costantini</a:t>
+              <a:rPr lang="it-IT" smtClean="0"/>
+              <a:t>INFDEV026A - G. Costantini, F. Di Giacomo, G. Maggiore</a:t>
             </a:r>
             <a:endParaRPr lang="en-GB"/>
           </a:p>
@@ -11271,8 +11315,8 @@
           <a:lstStyle/>
           <a:p>
             <a:r>
-              <a:rPr lang="en-GB" smtClean="0"/>
-              <a:t>INFDEV016A - G. Costantini</a:t>
+              <a:rPr lang="it-IT" smtClean="0"/>
+              <a:t>INFDEV026A - G. Costantini, F. Di Giacomo, G. Maggiore</a:t>
             </a:r>
             <a:endParaRPr lang="en-GB"/>
           </a:p>
@@ -11495,8 +11539,8 @@
           <a:lstStyle/>
           <a:p>
             <a:r>
-              <a:rPr lang="en-GB" smtClean="0"/>
-              <a:t>INFDEV016A - G. Costantini</a:t>
+              <a:rPr lang="it-IT" smtClean="0"/>
+              <a:t>INFDEV026A - G. Costantini, F. Di Giacomo, G. Maggiore</a:t>
             </a:r>
             <a:endParaRPr lang="en-GB"/>
           </a:p>
@@ -11624,8 +11668,8 @@
           <a:lstStyle/>
           <a:p>
             <a:r>
-              <a:rPr lang="en-GB" smtClean="0"/>
-              <a:t>INFDEV016A - G. Costantini</a:t>
+              <a:rPr lang="it-IT" smtClean="0"/>
+              <a:t>INFDEV026A - G. Costantini, F. Di Giacomo, G. Maggiore</a:t>
             </a:r>
             <a:endParaRPr lang="en-GB"/>
           </a:p>
@@ -11817,8 +11861,8 @@
           <a:lstStyle/>
           <a:p>
             <a:r>
-              <a:rPr lang="en-GB" smtClean="0"/>
-              <a:t>INFDEV016A - G. Costantini</a:t>
+              <a:rPr lang="it-IT" smtClean="0"/>
+              <a:t>INFDEV026A - G. Costantini, F. Di Giacomo, G. Maggiore</a:t>
             </a:r>
             <a:endParaRPr lang="en-GB"/>
           </a:p>
@@ -12378,8 +12422,8 @@
           <a:lstStyle/>
           <a:p>
             <a:r>
-              <a:rPr lang="en-GB" smtClean="0"/>
-              <a:t>INFDEV016A - G. Costantini</a:t>
+              <a:rPr lang="it-IT" smtClean="0"/>
+              <a:t>INFDEV026A - G. Costantini, F. Di Giacomo, G. Maggiore</a:t>
             </a:r>
             <a:endParaRPr lang="en-GB"/>
           </a:p>
@@ -12492,8 +12536,8 @@
           <a:lstStyle/>
           <a:p>
             <a:r>
-              <a:rPr lang="en-GB" smtClean="0"/>
-              <a:t>INFDEV016A - G. Costantini</a:t>
+              <a:rPr lang="it-IT" smtClean="0"/>
+              <a:t>INFDEV026A - G. Costantini, F. Di Giacomo, G. Maggiore</a:t>
             </a:r>
             <a:endParaRPr lang="en-GB"/>
           </a:p>
@@ -12729,8 +12773,8 @@
           <a:lstStyle/>
           <a:p>
             <a:r>
-              <a:rPr lang="en-GB" smtClean="0"/>
-              <a:t>INFDEV016A - G. Costantini</a:t>
+              <a:rPr lang="it-IT" smtClean="0"/>
+              <a:t>INFDEV026A - G. Costantini, F. Di Giacomo, G. Maggiore</a:t>
             </a:r>
             <a:endParaRPr lang="en-GB"/>
           </a:p>
@@ -13211,8 +13255,8 @@
           <a:lstStyle/>
           <a:p>
             <a:r>
-              <a:rPr lang="en-GB" smtClean="0"/>
-              <a:t>INFDEV016A - G. Costantini</a:t>
+              <a:rPr lang="it-IT" smtClean="0"/>
+              <a:t>INFDEV026A - G. Costantini, F. Di Giacomo, G. Maggiore</a:t>
             </a:r>
             <a:endParaRPr lang="en-GB"/>
           </a:p>
@@ -13383,8 +13427,8 @@
           <a:lstStyle/>
           <a:p>
             <a:r>
-              <a:rPr lang="en-GB" smtClean="0"/>
-              <a:t>INFDEV016A - G. Costantini</a:t>
+              <a:rPr lang="it-IT" smtClean="0"/>
+              <a:t>INFDEV026A - G. Costantini, F. Di Giacomo, G. Maggiore</a:t>
             </a:r>
             <a:endParaRPr lang="en-GB"/>
           </a:p>
@@ -14276,8 +14320,8 @@
           <a:lstStyle/>
           <a:p>
             <a:r>
-              <a:rPr lang="en-GB" smtClean="0"/>
-              <a:t>INFDEV016A - G. Costantini</a:t>
+              <a:rPr lang="it-IT" smtClean="0"/>
+              <a:t>INFDEV026A - G. Costantini, F. Di Giacomo, G. Maggiore</a:t>
             </a:r>
             <a:endParaRPr lang="en-GB"/>
           </a:p>
@@ -15670,8 +15714,8 @@
           <a:lstStyle/>
           <a:p>
             <a:r>
-              <a:rPr lang="en-GB" smtClean="0"/>
-              <a:t>INFDEV016A - G. Costantini</a:t>
+              <a:rPr lang="it-IT" smtClean="0"/>
+              <a:t>INFDEV026A - G. Costantini, F. Di Giacomo, G. Maggiore</a:t>
             </a:r>
             <a:endParaRPr lang="en-GB"/>
           </a:p>
@@ -17241,8 +17285,8 @@
           <a:lstStyle/>
           <a:p>
             <a:r>
-              <a:rPr lang="en-GB" smtClean="0"/>
-              <a:t>INFDEV016A - G. Costantini</a:t>
+              <a:rPr lang="it-IT" smtClean="0"/>
+              <a:t>INFDEV026A - G. Costantini, F. Di Giacomo, G. Maggiore</a:t>
             </a:r>
             <a:endParaRPr lang="en-GB"/>
           </a:p>
@@ -17368,8 +17412,8 @@
           <a:lstStyle/>
           <a:p>
             <a:r>
-              <a:rPr lang="en-GB" dirty="0" smtClean="0"/>
-              <a:t>INFDEV016A - G. Costantini</a:t>
+              <a:rPr lang="it-IT" smtClean="0"/>
+              <a:t>INFDEV026A - G. Costantini, F. Di Giacomo, G. Maggiore</a:t>
             </a:r>
             <a:endParaRPr lang="en-GB" dirty="0"/>
           </a:p>
@@ -18762,8 +18806,8 @@
           <a:lstStyle/>
           <a:p>
             <a:r>
-              <a:rPr lang="en-GB" dirty="0" smtClean="0"/>
-              <a:t>INFDEV016A - G. Costantini</a:t>
+              <a:rPr lang="it-IT" smtClean="0"/>
+              <a:t>INFDEV026A - G. Costantini, F. Di Giacomo, G. Maggiore</a:t>
             </a:r>
             <a:endParaRPr lang="en-GB" dirty="0"/>
           </a:p>
@@ -20156,8 +20200,8 @@
           <a:lstStyle/>
           <a:p>
             <a:r>
-              <a:rPr lang="en-GB" dirty="0" smtClean="0"/>
-              <a:t>INFDEV016A - G. Costantini</a:t>
+              <a:rPr lang="it-IT" smtClean="0"/>
+              <a:t>INFDEV026A - G. Costantini, F. Di Giacomo, G. Maggiore</a:t>
             </a:r>
             <a:endParaRPr lang="en-GB" dirty="0"/>
           </a:p>
@@ -21550,8 +21594,8 @@
           <a:lstStyle/>
           <a:p>
             <a:r>
-              <a:rPr lang="en-GB" dirty="0" smtClean="0"/>
-              <a:t>INFDEV016A - G. Costantini</a:t>
+              <a:rPr lang="it-IT" smtClean="0"/>
+              <a:t>INFDEV026A - G. Costantini, F. Di Giacomo, G. Maggiore</a:t>
             </a:r>
             <a:endParaRPr lang="en-GB" dirty="0"/>
           </a:p>
@@ -22944,8 +22988,8 @@
           <a:lstStyle/>
           <a:p>
             <a:r>
-              <a:rPr lang="en-GB" dirty="0" smtClean="0"/>
-              <a:t>INFDEV016A - G. Costantini</a:t>
+              <a:rPr lang="it-IT" smtClean="0"/>
+              <a:t>INFDEV026A - G. Costantini, F. Di Giacomo, G. Maggiore</a:t>
             </a:r>
             <a:endParaRPr lang="en-GB" dirty="0"/>
           </a:p>
@@ -24338,8 +24382,8 @@
           <a:lstStyle/>
           <a:p>
             <a:r>
-              <a:rPr lang="en-GB" dirty="0" smtClean="0"/>
-              <a:t>INFDEV016A - G. Costantini</a:t>
+              <a:rPr lang="it-IT" smtClean="0"/>
+              <a:t>INFDEV026A - G. Costantini, F. Di Giacomo, G. Maggiore</a:t>
             </a:r>
             <a:endParaRPr lang="en-GB" dirty="0"/>
           </a:p>
@@ -25732,8 +25776,8 @@
           <a:lstStyle/>
           <a:p>
             <a:r>
-              <a:rPr lang="en-GB" dirty="0" smtClean="0"/>
-              <a:t>INFDEV016A - G. Costantini</a:t>
+              <a:rPr lang="it-IT" smtClean="0"/>
+              <a:t>INFDEV026A - G. Costantini, F. Di Giacomo, G. Maggiore</a:t>
             </a:r>
             <a:endParaRPr lang="en-GB" dirty="0"/>
           </a:p>
@@ -27126,8 +27170,8 @@
           <a:lstStyle/>
           <a:p>
             <a:r>
-              <a:rPr lang="en-GB" dirty="0" smtClean="0"/>
-              <a:t>INFDEV016A - G. Costantini</a:t>
+              <a:rPr lang="it-IT" smtClean="0"/>
+              <a:t>INFDEV026A - G. Costantini, F. Di Giacomo, G. Maggiore</a:t>
             </a:r>
             <a:endParaRPr lang="en-GB" dirty="0"/>
           </a:p>
@@ -28520,8 +28564,8 @@
           <a:lstStyle/>
           <a:p>
             <a:r>
-              <a:rPr lang="en-GB" dirty="0" smtClean="0"/>
-              <a:t>INFDEV016A - G. Costantini</a:t>
+              <a:rPr lang="it-IT" smtClean="0"/>
+              <a:t>INFDEV026A - G. Costantini, F. Di Giacomo, G. Maggiore</a:t>
             </a:r>
             <a:endParaRPr lang="en-GB" dirty="0"/>
           </a:p>
@@ -29914,8 +29958,8 @@
           <a:lstStyle/>
           <a:p>
             <a:r>
-              <a:rPr lang="en-GB" dirty="0" smtClean="0"/>
-              <a:t>INFDEV016A - G. Costantini</a:t>
+              <a:rPr lang="it-IT" smtClean="0"/>
+              <a:t>INFDEV026A - G. Costantini, F. Di Giacomo, G. Maggiore</a:t>
             </a:r>
             <a:endParaRPr lang="en-GB" dirty="0"/>
           </a:p>
@@ -31267,29 +31311,6 @@
           </a:p>
         </p:txBody>
       </p:sp>
-      <p:sp>
-        <p:nvSpPr>
-          <p:cNvPr id="4" name="Footer Placeholder 3"/>
-          <p:cNvSpPr>
-            <a:spLocks noGrp="1"/>
-          </p:cNvSpPr>
-          <p:nvPr>
-            <p:ph type="ftr" sz="quarter" idx="11"/>
-          </p:nvPr>
-        </p:nvSpPr>
-        <p:spPr/>
-        <p:txBody>
-          <a:bodyPr/>
-          <a:lstStyle/>
-          <a:p>
-            <a:r>
-              <a:rPr lang="en-GB" smtClean="0"/>
-              <a:t>INFDEV016A - G. Costantini</a:t>
-            </a:r>
-            <a:endParaRPr lang="en-GB"/>
-          </a:p>
-        </p:txBody>
-      </p:sp>
       <p:pic>
         <p:nvPicPr>
           <p:cNvPr id="1026" name="Picture 2" descr="http://tctechcrunch2011.files.wordpress.com/2013/01/facebook-social-graph1.jpg"/>
@@ -31574,8 +31595,8 @@
           <a:lstStyle/>
           <a:p>
             <a:r>
-              <a:rPr lang="en-GB" dirty="0" smtClean="0"/>
-              <a:t>INFDEV016A - G. Costantini</a:t>
+              <a:rPr lang="it-IT" smtClean="0"/>
+              <a:t>INFDEV026A - G. Costantini, F. Di Giacomo, G. Maggiore</a:t>
             </a:r>
             <a:endParaRPr lang="en-GB" dirty="0"/>
           </a:p>
@@ -32968,8 +32989,8 @@
           <a:lstStyle/>
           <a:p>
             <a:r>
-              <a:rPr lang="en-GB" dirty="0" smtClean="0"/>
-              <a:t>INFDEV016A - G. Costantini</a:t>
+              <a:rPr lang="it-IT" smtClean="0"/>
+              <a:t>INFDEV026A - G. Costantini, F. Di Giacomo, G. Maggiore</a:t>
             </a:r>
             <a:endParaRPr lang="en-GB" dirty="0"/>
           </a:p>
@@ -34362,8 +34383,8 @@
           <a:lstStyle/>
           <a:p>
             <a:r>
-              <a:rPr lang="en-GB" dirty="0" smtClean="0"/>
-              <a:t>INFDEV016A - G. Costantini</a:t>
+              <a:rPr lang="it-IT" smtClean="0"/>
+              <a:t>INFDEV026A - G. Costantini, F. Di Giacomo, G. Maggiore</a:t>
             </a:r>
             <a:endParaRPr lang="en-GB" dirty="0"/>
           </a:p>
@@ -35756,8 +35777,8 @@
           <a:lstStyle/>
           <a:p>
             <a:r>
-              <a:rPr lang="en-GB" dirty="0" smtClean="0"/>
-              <a:t>INFDEV016A - G. Costantini</a:t>
+              <a:rPr lang="it-IT" smtClean="0"/>
+              <a:t>INFDEV026A - G. Costantini, F. Di Giacomo, G. Maggiore</a:t>
             </a:r>
             <a:endParaRPr lang="en-GB" dirty="0"/>
           </a:p>
@@ -37219,8 +37240,8 @@
           <a:lstStyle/>
           <a:p>
             <a:r>
-              <a:rPr lang="en-GB" smtClean="0"/>
-              <a:t>INFDEV016A - G. Costantini</a:t>
+              <a:rPr lang="it-IT" smtClean="0"/>
+              <a:t>INFDEV026A - G. Costantini, F. Di Giacomo, G. Maggiore</a:t>
             </a:r>
             <a:endParaRPr lang="en-GB"/>
           </a:p>
@@ -37604,8 +37625,8 @@
           <a:lstStyle/>
           <a:p>
             <a:r>
-              <a:rPr lang="en-GB" smtClean="0"/>
-              <a:t>INFDEV016A - G. Costantini</a:t>
+              <a:rPr lang="it-IT" smtClean="0"/>
+              <a:t>INFDEV026A - G. Costantini, F. Di Giacomo, G. Maggiore</a:t>
             </a:r>
             <a:endParaRPr lang="en-GB"/>
           </a:p>
@@ -37693,6 +37714,13 @@
           </a:bodyPr>
           <a:lstStyle/>
           <a:p>
+            <a:endParaRPr lang="en-GB" b="1" i="1" dirty="0" smtClean="0">
+              <a:solidFill>
+                <a:srgbClr val="FF0000"/>
+              </a:solidFill>
+            </a:endParaRPr>
+          </a:p>
+          <a:p>
             <a:r>
               <a:rPr lang="en-GB" b="1" i="1" dirty="0" smtClean="0">
                 <a:solidFill>
@@ -37847,13 +37875,54 @@
           <a:lstStyle/>
           <a:p>
             <a:r>
-              <a:rPr lang="en-GB" smtClean="0"/>
-              <a:t>INFDEV016A - G. Costantini</a:t>
+              <a:rPr lang="it-IT" smtClean="0"/>
+              <a:t>INFDEV026A - G. Costantini, F. Di Giacomo, G. Maggiore</a:t>
             </a:r>
             <a:endParaRPr lang="en-GB"/>
           </a:p>
         </p:txBody>
       </p:sp>
+      <p:pic>
+        <p:nvPicPr>
+          <p:cNvPr id="1026" name="Picture 2" descr="http://www.hov-haaksbergen.nl/wp-content/uploads/2014/12/Prettige-feestdagen.jpg"/>
+          <p:cNvPicPr>
+            <a:picLocks noChangeAspect="1" noChangeArrowheads="1"/>
+          </p:cNvPicPr>
+          <p:nvPr/>
+        </p:nvPicPr>
+        <p:blipFill>
+          <a:blip r:embed="rId2">
+            <a:extLst>
+              <a:ext uri="{28A0092B-C50C-407E-A947-70E740481C1C}">
+                <a14:useLocalDpi xmlns:a14="http://schemas.microsoft.com/office/drawing/2010/main" val="0"/>
+              </a:ext>
+            </a:extLst>
+          </a:blip>
+          <a:srcRect/>
+          <a:stretch>
+            <a:fillRect/>
+          </a:stretch>
+        </p:blipFill>
+        <p:spPr bwMode="auto">
+          <a:xfrm>
+            <a:off x="4442316" y="247300"/>
+            <a:ext cx="4172615" cy="2045399"/>
+          </a:xfrm>
+          <a:prstGeom prst="rect">
+            <a:avLst/>
+          </a:prstGeom>
+          <a:noFill/>
+          <a:extLst>
+            <a:ext uri="{909E8E84-426E-40DD-AFC4-6F175D3DCCD1}">
+              <a14:hiddenFill xmlns:a14="http://schemas.microsoft.com/office/drawing/2010/main">
+                <a:solidFill>
+                  <a:srgbClr val="FFFFFF"/>
+                </a:solidFill>
+              </a14:hiddenFill>
+            </a:ext>
+          </a:extLst>
+        </p:spPr>
+      </p:pic>
     </p:spTree>
     <p:extLst>
       <p:ext uri="{BB962C8B-B14F-4D97-AF65-F5344CB8AC3E}">
@@ -38079,8 +38148,8 @@
           <a:lstStyle/>
           <a:p>
             <a:r>
-              <a:rPr lang="en-GB" smtClean="0"/>
-              <a:t>INFDEV016A - G. Costantini</a:t>
+              <a:rPr lang="it-IT" smtClean="0"/>
+              <a:t>INFDEV026A - G. Costantini, F. Di Giacomo, G. Maggiore</a:t>
             </a:r>
             <a:endParaRPr lang="en-GB"/>
           </a:p>
@@ -38168,11 +38237,11 @@
   <p:clrMapOvr>
     <a:masterClrMapping/>
   </p:clrMapOvr>
-  <mc:AlternateContent xmlns:mc="http://schemas.openxmlformats.org/markup-compatibility/2006">
-    <mc:Choice xmlns:p14="http://schemas.microsoft.com/office/powerpoint/2010/main" Requires="p14">
+  <mc:AlternateContent xmlns:mc="http://schemas.openxmlformats.org/markup-compatibility/2006" xmlns:p14="http://schemas.microsoft.com/office/powerpoint/2010/main">
+    <mc:Choice Requires="p14">
       <p:transition spd="slow" p14:dur="2000"/>
     </mc:Choice>
-    <mc:Fallback>
+    <mc:Fallback xmlns="">
       <p:transition spd="slow"/>
     </mc:Fallback>
   </mc:AlternateContent>
@@ -38419,8 +38488,8 @@
           <a:lstStyle/>
           <a:p>
             <a:r>
-              <a:rPr lang="en-GB" smtClean="0"/>
-              <a:t>INFDEV016A - G. Costantini</a:t>
+              <a:rPr lang="it-IT" smtClean="0"/>
+              <a:t>INFDEV026A - G. Costantini, F. Di Giacomo, G. Maggiore</a:t>
             </a:r>
             <a:endParaRPr lang="en-GB"/>
           </a:p>
@@ -38989,8 +39058,8 @@
           <a:lstStyle/>
           <a:p>
             <a:r>
-              <a:rPr lang="en-GB" dirty="0" smtClean="0"/>
-              <a:t>INFDEV016A - G. Costantini</a:t>
+              <a:rPr lang="it-IT" smtClean="0"/>
+              <a:t>INFDEV026A - G. Costantini, F. Di Giacomo, G. Maggiore</a:t>
             </a:r>
             <a:endParaRPr lang="en-GB" dirty="0"/>
           </a:p>
@@ -39030,11 +39099,11 @@
   <p:clrMapOvr>
     <a:masterClrMapping/>
   </p:clrMapOvr>
-  <mc:AlternateContent xmlns:mc="http://schemas.openxmlformats.org/markup-compatibility/2006">
-    <mc:Choice xmlns:p14="http://schemas.microsoft.com/office/powerpoint/2010/main" Requires="p14">
+  <mc:AlternateContent xmlns:mc="http://schemas.openxmlformats.org/markup-compatibility/2006" xmlns:p14="http://schemas.microsoft.com/office/powerpoint/2010/main">
+    <mc:Choice Requires="p14">
       <p:transition spd="slow" p14:dur="2000"/>
     </mc:Choice>
-    <mc:Fallback>
+    <mc:Fallback xmlns="">
       <p:transition spd="slow"/>
     </mc:Fallback>
   </mc:AlternateContent>
@@ -39082,18 +39151,14 @@
           <a:p>
             <a:r>
               <a:rPr lang="en-GB" dirty="0" smtClean="0"/>
-              <a:t>Graphs </a:t>
-            </a:r>
-            <a:r>
-              <a:rPr lang="en-GB" dirty="0" smtClean="0"/>
-              <a:t>– Definition  </a:t>
+              <a:t>Graphs – Definition  </a:t>
             </a:r>
             <a:endParaRPr lang="en-GB" dirty="0"/>
           </a:p>
         </p:txBody>
       </p:sp>
-      <mc:AlternateContent xmlns:mc="http://schemas.openxmlformats.org/markup-compatibility/2006">
-        <mc:Choice xmlns:a14="http://schemas.microsoft.com/office/drawing/2010/main" Requires="a14">
+      <mc:AlternateContent xmlns:mc="http://schemas.openxmlformats.org/markup-compatibility/2006" xmlns:a14="http://schemas.microsoft.com/office/drawing/2010/main">
+        <mc:Choice Requires="a14">
           <p:sp>
             <p:nvSpPr>
               <p:cNvPr id="3" name="Content Placeholder 2"/>
@@ -39116,11 +39181,7 @@
               <a:p>
                 <a:r>
                   <a:rPr lang="en-US" dirty="0" smtClean="0"/>
-                  <a:t>Nonlinear </a:t>
-                </a:r>
-                <a:r>
-                  <a:rPr lang="en-US" dirty="0" smtClean="0"/>
-                  <a:t>structure made by</a:t>
+                  <a:t>Nonlinear structure made by</a:t>
                 </a:r>
               </a:p>
               <a:p>
@@ -39312,7 +39373,7 @@
             </p:txBody>
           </p:sp>
         </mc:Choice>
-        <mc:Fallback>
+        <mc:Fallback xmlns="">
           <p:sp>
             <p:nvSpPr>
               <p:cNvPr id="3" name="Content Placeholder 2"/>
@@ -39366,8 +39427,8 @@
           <a:lstStyle/>
           <a:p>
             <a:r>
-              <a:rPr lang="en-GB" smtClean="0"/>
-              <a:t>INFDEV016A - G. Costantini</a:t>
+              <a:rPr lang="it-IT" smtClean="0"/>
+              <a:t>INFDEV026A - G. Costantini, F. Di Giacomo, G. Maggiore</a:t>
             </a:r>
             <a:endParaRPr lang="en-GB"/>
           </a:p>
@@ -39482,8 +39543,8 @@
           </a:p>
         </p:txBody>
       </p:sp>
-      <mc:AlternateContent xmlns:mc="http://schemas.openxmlformats.org/markup-compatibility/2006">
-        <mc:Choice xmlns:a14="http://schemas.microsoft.com/office/drawing/2010/main" Requires="a14">
+      <mc:AlternateContent xmlns:mc="http://schemas.openxmlformats.org/markup-compatibility/2006" xmlns:a14="http://schemas.microsoft.com/office/drawing/2010/main">
+        <mc:Choice Requires="a14">
           <p:sp>
             <p:nvSpPr>
               <p:cNvPr id="3" name="Tijdelijke aanduiding voor inhoud 2"/>
@@ -39602,7 +39663,7 @@
             </p:txBody>
           </p:sp>
         </mc:Choice>
-        <mc:Fallback>
+        <mc:Fallback xmlns="">
           <p:sp>
             <p:nvSpPr>
               <p:cNvPr id="3" name="Tijdelijke aanduiding voor inhoud 2"/>
@@ -39652,8 +39713,8 @@
           <a:lstStyle/>
           <a:p>
             <a:r>
-              <a:rPr lang="en-GB" smtClean="0"/>
-              <a:t>INFDEV016A - G. Costantini</a:t>
+              <a:rPr lang="it-IT" smtClean="0"/>
+              <a:t>INFDEV026A - G. Costantini, F. Di Giacomo, G. Maggiore</a:t>
             </a:r>
             <a:endParaRPr lang="en-GB"/>
           </a:p>
@@ -39669,11 +39730,11 @@
   <p:clrMapOvr>
     <a:masterClrMapping/>
   </p:clrMapOvr>
-  <mc:AlternateContent xmlns:mc="http://schemas.openxmlformats.org/markup-compatibility/2006">
-    <mc:Choice xmlns:p14="http://schemas.microsoft.com/office/powerpoint/2010/main" Requires="p14">
+  <mc:AlternateContent xmlns:mc="http://schemas.openxmlformats.org/markup-compatibility/2006" xmlns:p14="http://schemas.microsoft.com/office/powerpoint/2010/main">
+    <mc:Choice Requires="p14">
       <p:transition spd="slow" p14:dur="2000"/>
     </mc:Choice>
-    <mc:Fallback>
+    <mc:Fallback xmlns="">
       <p:transition spd="slow"/>
     </mc:Fallback>
   </mc:AlternateContent>
@@ -39720,8 +39781,8 @@
           </a:p>
         </p:txBody>
       </p:sp>
-      <mc:AlternateContent xmlns:mc="http://schemas.openxmlformats.org/markup-compatibility/2006">
-        <mc:Choice xmlns:a14="http://schemas.microsoft.com/office/drawing/2010/main" Requires="a14">
+      <mc:AlternateContent xmlns:mc="http://schemas.openxmlformats.org/markup-compatibility/2006" xmlns:a14="http://schemas.microsoft.com/office/drawing/2010/main">
+        <mc:Choice Requires="a14">
           <p:sp>
             <p:nvSpPr>
               <p:cNvPr id="3" name="Content Placeholder 2"/>
@@ -40290,7 +40351,7 @@
             </p:txBody>
           </p:sp>
         </mc:Choice>
-        <mc:Fallback>
+        <mc:Fallback xmlns="">
           <p:sp>
             <p:nvSpPr>
               <p:cNvPr id="3" name="Content Placeholder 2"/>
@@ -40344,8 +40405,8 @@
           <a:lstStyle/>
           <a:p>
             <a:r>
-              <a:rPr lang="en-GB" dirty="0" smtClean="0"/>
-              <a:t>INFDEV016A - G. Costantini</a:t>
+              <a:rPr lang="it-IT" smtClean="0"/>
+              <a:t>INFDEV026A - G. Costantini, F. Di Giacomo, G. Maggiore</a:t>
             </a:r>
             <a:endParaRPr lang="en-GB" dirty="0"/>
           </a:p>
@@ -40375,8 +40436,8 @@
           </a:prstGeom>
         </p:spPr>
       </p:pic>
-      <mc:AlternateContent xmlns:mc="http://schemas.openxmlformats.org/markup-compatibility/2006">
-        <mc:Choice xmlns:a14="http://schemas.microsoft.com/office/drawing/2010/main" Requires="a14">
+      <mc:AlternateContent xmlns:mc="http://schemas.openxmlformats.org/markup-compatibility/2006" xmlns:a14="http://schemas.microsoft.com/office/drawing/2010/main">
+        <mc:Choice Requires="a14">
           <p:sp>
             <p:nvSpPr>
               <p:cNvPr id="6" name="TextBox 5"/>
@@ -40481,7 +40542,7 @@
             </p:txBody>
           </p:sp>
         </mc:Choice>
-        <mc:Fallback>
+        <mc:Fallback xmlns="">
           <p:sp>
             <p:nvSpPr>
               <p:cNvPr id="6" name="TextBox 5"/>
@@ -40520,8 +40581,8 @@
           </p:sp>
         </mc:Fallback>
       </mc:AlternateContent>
-      <mc:AlternateContent xmlns:mc="http://schemas.openxmlformats.org/markup-compatibility/2006">
-        <mc:Choice xmlns:a14="http://schemas.microsoft.com/office/drawing/2010/main" Requires="a14">
+      <mc:AlternateContent xmlns:mc="http://schemas.openxmlformats.org/markup-compatibility/2006" xmlns:a14="http://schemas.microsoft.com/office/drawing/2010/main">
+        <mc:Choice Requires="a14">
           <p:sp>
             <p:nvSpPr>
               <p:cNvPr id="7" name="Rectangle 6"/>
@@ -40630,7 +40691,7 @@
             </p:txBody>
           </p:sp>
         </mc:Choice>
-        <mc:Fallback>
+        <mc:Fallback xmlns="">
           <p:sp>
             <p:nvSpPr>
               <p:cNvPr id="7" name="Rectangle 6"/>
@@ -40836,8 +40897,8 @@
           <a:lstStyle/>
           <a:p>
             <a:r>
-              <a:rPr lang="en-GB" smtClean="0"/>
-              <a:t>INFDEV016A - G. Costantini</a:t>
+              <a:rPr lang="it-IT" smtClean="0"/>
+              <a:t>INFDEV026A - G. Costantini, F. Di Giacomo, G. Maggiore</a:t>
             </a:r>
             <a:endParaRPr lang="en-GB"/>
           </a:p>
@@ -40962,8 +41023,8 @@
           <a:lstStyle/>
           <a:p>
             <a:r>
-              <a:rPr lang="en-GB" smtClean="0"/>
-              <a:t>INFDEV016A - G. Costantini</a:t>
+              <a:rPr lang="it-IT" smtClean="0"/>
+              <a:t>INFDEV026A - G. Costantini, F. Di Giacomo, G. Maggiore</a:t>
             </a:r>
             <a:endParaRPr lang="en-GB"/>
           </a:p>
@@ -41929,8 +41990,8 @@
           <a:lstStyle/>
           <a:p>
             <a:r>
-              <a:rPr lang="en-GB" smtClean="0"/>
-              <a:t>INFDEV016A - G. Costantini</a:t>
+              <a:rPr lang="it-IT" smtClean="0"/>
+              <a:t>INFDEV026A - G. Costantini, F. Di Giacomo, G. Maggiore</a:t>
             </a:r>
             <a:endParaRPr lang="en-GB"/>
           </a:p>

</xml_diff>

<commit_message>
slides week 5 updated; pdf added
</commit_message>
<xml_diff>
--- a/Slides/Week 5 - Graphs.pptx
+++ b/Slides/Week 5 - Graphs.pptx
@@ -246,7 +246,7 @@
           <a:p>
             <a:fld id="{F314420D-16BA-4EDC-9A71-800590EAD5A3}" type="datetimeFigureOut">
               <a:rPr lang="en-GB" smtClean="0"/>
-              <a:t>11/12/2015</a:t>
+              <a:t>15/12/2015</a:t>
             </a:fld>
             <a:endParaRPr lang="en-GB"/>
           </a:p>
@@ -1094,6 +1094,181 @@
       </p:grpSpPr>
       <p:sp>
         <p:nvSpPr>
+          <p:cNvPr id="2" name="Tijdelijke aanduiding voor dia-afbeelding 1"/>
+          <p:cNvSpPr>
+            <a:spLocks noGrp="1" noRot="1" noChangeAspect="1"/>
+          </p:cNvSpPr>
+          <p:nvPr>
+            <p:ph type="sldImg"/>
+          </p:nvPr>
+        </p:nvSpPr>
+        <p:spPr/>
+      </p:sp>
+      <p:sp>
+        <p:nvSpPr>
+          <p:cNvPr id="3" name="Tijdelijke aanduiding voor notities 2"/>
+          <p:cNvSpPr>
+            <a:spLocks noGrp="1"/>
+          </p:cNvSpPr>
+          <p:nvPr>
+            <p:ph type="body" idx="1"/>
+          </p:nvPr>
+        </p:nvSpPr>
+        <p:spPr/>
+        <p:txBody>
+          <a:bodyPr/>
+          <a:lstStyle/>
+          <a:p>
+            <a:pPr lvl="1"/>
+            <a:r>
+              <a:rPr lang="nl-NL" dirty="0" smtClean="0"/>
+              <a:t>At </a:t>
+            </a:r>
+            <a:r>
+              <a:rPr lang="nl-NL" dirty="0" err="1" smtClean="0"/>
+              <a:t>every</a:t>
+            </a:r>
+            <a:r>
+              <a:rPr lang="nl-NL" dirty="0" smtClean="0"/>
+              <a:t> iteration push </a:t>
+            </a:r>
+            <a:r>
+              <a:rPr lang="nl-NL" dirty="0" err="1" smtClean="0"/>
+              <a:t>one</a:t>
+            </a:r>
+            <a:r>
+              <a:rPr lang="nl-NL" dirty="0" smtClean="0"/>
+              <a:t> </a:t>
+            </a:r>
+            <a:r>
+              <a:rPr lang="nl-NL" dirty="0" err="1" smtClean="0"/>
+              <a:t>neighbour</a:t>
+            </a:r>
+            <a:r>
+              <a:rPr lang="nl-NL" dirty="0" smtClean="0"/>
+              <a:t> of </a:t>
+            </a:r>
+            <a:r>
+              <a:rPr lang="nl-NL" dirty="0" err="1" smtClean="0"/>
+              <a:t>the</a:t>
+            </a:r>
+            <a:r>
+              <a:rPr lang="nl-NL" dirty="0" smtClean="0"/>
+              <a:t> top node</a:t>
+            </a:r>
+          </a:p>
+          <a:p>
+            <a:pPr lvl="1"/>
+            <a:r>
+              <a:rPr lang="nl-NL" dirty="0" smtClean="0"/>
+              <a:t>Pop </a:t>
+            </a:r>
+            <a:r>
+              <a:rPr lang="nl-NL" dirty="0" err="1" smtClean="0"/>
+              <a:t>when</a:t>
+            </a:r>
+            <a:r>
+              <a:rPr lang="nl-NL" dirty="0" smtClean="0"/>
+              <a:t> no </a:t>
+            </a:r>
+            <a:r>
+              <a:rPr lang="nl-NL" dirty="0" err="1" smtClean="0"/>
+              <a:t>other</a:t>
+            </a:r>
+            <a:r>
+              <a:rPr lang="nl-NL" dirty="0" smtClean="0"/>
+              <a:t> </a:t>
+            </a:r>
+            <a:r>
+              <a:rPr lang="nl-NL" dirty="0" err="1" smtClean="0"/>
+              <a:t>neighbours</a:t>
+            </a:r>
+            <a:r>
+              <a:rPr lang="nl-NL" dirty="0" smtClean="0"/>
+              <a:t> </a:t>
+            </a:r>
+            <a:r>
+              <a:rPr lang="nl-NL" dirty="0" err="1" smtClean="0"/>
+              <a:t>to</a:t>
+            </a:r>
+            <a:r>
+              <a:rPr lang="nl-NL" dirty="0" smtClean="0"/>
+              <a:t> </a:t>
+            </a:r>
+            <a:r>
+              <a:rPr lang="nl-NL" dirty="0" err="1" smtClean="0"/>
+              <a:t>visit</a:t>
+            </a:r>
+            <a:r>
+              <a:rPr lang="nl-NL" dirty="0" smtClean="0"/>
+              <a:t> </a:t>
+            </a:r>
+            <a:r>
+              <a:rPr lang="nl-NL" dirty="0" err="1" smtClean="0"/>
+              <a:t>exist</a:t>
+            </a:r>
+            <a:endParaRPr lang="en-GB" dirty="0" smtClean="0"/>
+          </a:p>
+          <a:p>
+            <a:endParaRPr lang="nl-NL" dirty="0"/>
+          </a:p>
+        </p:txBody>
+      </p:sp>
+      <p:sp>
+        <p:nvSpPr>
+          <p:cNvPr id="4" name="Tijdelijke aanduiding voor dianummer 3"/>
+          <p:cNvSpPr>
+            <a:spLocks noGrp="1"/>
+          </p:cNvSpPr>
+          <p:nvPr>
+            <p:ph type="sldNum" sz="quarter" idx="10"/>
+          </p:nvPr>
+        </p:nvSpPr>
+        <p:spPr/>
+        <p:txBody>
+          <a:bodyPr/>
+          <a:lstStyle/>
+          <a:p>
+            <a:fld id="{29573B9A-66FB-4A63-BCD5-E140B9429FD2}" type="slidenum">
+              <a:rPr lang="en-GB" smtClean="0"/>
+              <a:t>23</a:t>
+            </a:fld>
+            <a:endParaRPr lang="en-GB"/>
+          </a:p>
+        </p:txBody>
+      </p:sp>
+    </p:spTree>
+    <p:extLst>
+      <p:ext uri="{BB962C8B-B14F-4D97-AF65-F5344CB8AC3E}">
+        <p14:creationId xmlns:p14="http://schemas.microsoft.com/office/powerpoint/2010/main" val="1187839925"/>
+      </p:ext>
+    </p:extLst>
+  </p:cSld>
+  <p:clrMapOvr>
+    <a:masterClrMapping/>
+  </p:clrMapOvr>
+</p:notes>
+</file>
+
+<file path=ppt/notesSlides/notesSlide7.xml><?xml version="1.0" encoding="utf-8"?>
+<p:notes xmlns:a="http://schemas.openxmlformats.org/drawingml/2006/main" xmlns:r="http://schemas.openxmlformats.org/officeDocument/2006/relationships" xmlns:p="http://schemas.openxmlformats.org/presentationml/2006/main">
+  <p:cSld>
+    <p:spTree>
+      <p:nvGrpSpPr>
+        <p:cNvPr id="1" name=""/>
+        <p:cNvGrpSpPr/>
+        <p:nvPr/>
+      </p:nvGrpSpPr>
+      <p:grpSpPr>
+        <a:xfrm>
+          <a:off x="0" y="0"/>
+          <a:ext cx="0" cy="0"/>
+          <a:chOff x="0" y="0"/>
+          <a:chExt cx="0" cy="0"/>
+        </a:xfrm>
+      </p:grpSpPr>
+      <p:sp>
+        <p:nvSpPr>
           <p:cNvPr id="2" name="Slide Image Placeholder 1"/>
           <p:cNvSpPr>
             <a:spLocks noGrp="1" noRot="1" noChangeAspect="1"/>
@@ -1271,7 +1446,103 @@
 </p:notes>
 </file>
 
-<file path=ppt/notesSlides/notesSlide7.xml><?xml version="1.0" encoding="utf-8"?>
+<file path=ppt/notesSlides/notesSlide8.xml><?xml version="1.0" encoding="utf-8"?>
+<p:notes xmlns:a="http://schemas.openxmlformats.org/drawingml/2006/main" xmlns:r="http://schemas.openxmlformats.org/officeDocument/2006/relationships" xmlns:p="http://schemas.openxmlformats.org/presentationml/2006/main">
+  <p:cSld>
+    <p:spTree>
+      <p:nvGrpSpPr>
+        <p:cNvPr id="1" name=""/>
+        <p:cNvGrpSpPr/>
+        <p:nvPr/>
+      </p:nvGrpSpPr>
+      <p:grpSpPr>
+        <a:xfrm>
+          <a:off x="0" y="0"/>
+          <a:ext cx="0" cy="0"/>
+          <a:chOff x="0" y="0"/>
+          <a:chExt cx="0" cy="0"/>
+        </a:xfrm>
+      </p:grpSpPr>
+      <p:sp>
+        <p:nvSpPr>
+          <p:cNvPr id="2" name="Tijdelijke aanduiding voor dia-afbeelding 1"/>
+          <p:cNvSpPr>
+            <a:spLocks noGrp="1" noRot="1" noChangeAspect="1"/>
+          </p:cNvSpPr>
+          <p:nvPr>
+            <p:ph type="sldImg"/>
+          </p:nvPr>
+        </p:nvSpPr>
+        <p:spPr/>
+      </p:sp>
+      <p:sp>
+        <p:nvSpPr>
+          <p:cNvPr id="3" name="Tijdelijke aanduiding voor notities 2"/>
+          <p:cNvSpPr>
+            <a:spLocks noGrp="1"/>
+          </p:cNvSpPr>
+          <p:nvPr>
+            <p:ph type="body" idx="1"/>
+          </p:nvPr>
+        </p:nvSpPr>
+        <p:spPr/>
+        <p:txBody>
+          <a:bodyPr/>
+          <a:lstStyle/>
+          <a:p>
+            <a:r>
+              <a:rPr lang="en-US" sz="1200" b="0" i="0" kern="1200" dirty="0" smtClean="0">
+                <a:solidFill>
+                  <a:schemeClr val="tx1"/>
+                </a:solidFill>
+                <a:effectLst/>
+                <a:latin typeface="+mn-lt"/>
+                <a:ea typeface="+mn-ea"/>
+                <a:cs typeface="+mn-cs"/>
+              </a:rPr>
+              <a:t>Dijkstra's algorithm will assign some initial distance values and will try to improve them step by step.</a:t>
+            </a:r>
+            <a:endParaRPr lang="nl-NL" dirty="0"/>
+          </a:p>
+        </p:txBody>
+      </p:sp>
+      <p:sp>
+        <p:nvSpPr>
+          <p:cNvPr id="4" name="Tijdelijke aanduiding voor dianummer 3"/>
+          <p:cNvSpPr>
+            <a:spLocks noGrp="1"/>
+          </p:cNvSpPr>
+          <p:nvPr>
+            <p:ph type="sldNum" sz="quarter" idx="10"/>
+          </p:nvPr>
+        </p:nvSpPr>
+        <p:spPr/>
+        <p:txBody>
+          <a:bodyPr/>
+          <a:lstStyle/>
+          <a:p>
+            <a:fld id="{29573B9A-66FB-4A63-BCD5-E140B9429FD2}" type="slidenum">
+              <a:rPr lang="en-GB" smtClean="0"/>
+              <a:t>26</a:t>
+            </a:fld>
+            <a:endParaRPr lang="en-GB"/>
+          </a:p>
+        </p:txBody>
+      </p:sp>
+    </p:spTree>
+    <p:extLst>
+      <p:ext uri="{BB962C8B-B14F-4D97-AF65-F5344CB8AC3E}">
+        <p14:creationId xmlns:p14="http://schemas.microsoft.com/office/powerpoint/2010/main" val="2203844136"/>
+      </p:ext>
+    </p:extLst>
+  </p:cSld>
+  <p:clrMapOvr>
+    <a:masterClrMapping/>
+  </p:clrMapOvr>
+</p:notes>
+</file>
+
+<file path=ppt/notesSlides/notesSlide9.xml><?xml version="1.0" encoding="utf-8"?>
 <p:notes xmlns:a="http://schemas.openxmlformats.org/drawingml/2006/main" xmlns:r="http://schemas.openxmlformats.org/officeDocument/2006/relationships" xmlns:p="http://schemas.openxmlformats.org/presentationml/2006/main">
   <p:cSld>
     <p:spTree>
@@ -2336,7 +2607,7 @@
           <a:p>
             <a:fld id="{6D0056B2-4F08-4129-BC21-E4EE9138FBBD}" type="datetime1">
               <a:rPr lang="en-GB" smtClean="0"/>
-              <a:t>11/12/2015</a:t>
+              <a:t>15/12/2015</a:t>
             </a:fld>
             <a:endParaRPr lang="en-GB"/>
           </a:p>
@@ -2591,7 +2862,7 @@
           <a:p>
             <a:fld id="{612D572C-2764-414E-9C89-DDD42C6B07C1}" type="datetime1">
               <a:rPr lang="en-GB" smtClean="0"/>
-              <a:t>11/12/2015</a:t>
+              <a:t>15/12/2015</a:t>
             </a:fld>
             <a:endParaRPr lang="en-GB"/>
           </a:p>
@@ -2909,7 +3180,7 @@
           <a:p>
             <a:fld id="{2F9DEDFE-25E5-4177-B37C-03C25AABCBD5}" type="datetime1">
               <a:rPr lang="en-GB" smtClean="0"/>
-              <a:t>11/12/2015</a:t>
+              <a:t>15/12/2015</a:t>
             </a:fld>
             <a:endParaRPr lang="en-GB"/>
           </a:p>
@@ -3240,7 +3511,7 @@
           <a:p>
             <a:fld id="{09077836-4222-4E87-A3F7-BF9743D61C38}" type="datetime1">
               <a:rPr lang="en-GB" smtClean="0"/>
-              <a:t>11/12/2015</a:t>
+              <a:t>15/12/2015</a:t>
             </a:fld>
             <a:endParaRPr lang="en-GB"/>
           </a:p>
@@ -3558,7 +3829,7 @@
           <a:p>
             <a:fld id="{5982107C-A272-44F7-BB13-558FCEBC42B2}" type="datetime1">
               <a:rPr lang="en-GB" smtClean="0"/>
-              <a:t>11/12/2015</a:t>
+              <a:t>15/12/2015</a:t>
             </a:fld>
             <a:endParaRPr lang="en-GB"/>
           </a:p>
@@ -3949,7 +4220,7 @@
           <a:p>
             <a:fld id="{F9658BBA-9690-4900-AE7A-80E9850FB3EA}" type="datetime1">
               <a:rPr lang="en-GB" smtClean="0"/>
-              <a:t>11/12/2015</a:t>
+              <a:t>15/12/2015</a:t>
             </a:fld>
             <a:endParaRPr lang="en-GB"/>
           </a:p>
@@ -4123,7 +4394,7 @@
           <a:p>
             <a:fld id="{BEB6CA79-FB04-4AE1-90FD-D2D3D2AAEEC1}" type="datetime1">
               <a:rPr lang="en-GB" smtClean="0"/>
-              <a:t>11/12/2015</a:t>
+              <a:t>15/12/2015</a:t>
             </a:fld>
             <a:endParaRPr lang="en-GB"/>
           </a:p>
@@ -4307,7 +4578,7 @@
           <a:p>
             <a:fld id="{6C950542-9F3C-4D20-A3AE-6E02D3EC84EE}" type="datetime1">
               <a:rPr lang="en-GB" smtClean="0"/>
-              <a:t>11/12/2015</a:t>
+              <a:t>15/12/2015</a:t>
             </a:fld>
             <a:endParaRPr lang="en-GB"/>
           </a:p>
@@ -4481,7 +4752,7 @@
           <a:p>
             <a:fld id="{F58B147D-FA68-4708-8C51-0F326ACB9AAA}" type="datetime1">
               <a:rPr lang="en-GB" smtClean="0"/>
-              <a:t>11/12/2015</a:t>
+              <a:t>15/12/2015</a:t>
             </a:fld>
             <a:endParaRPr lang="en-GB"/>
           </a:p>
@@ -4732,7 +5003,7 @@
           <a:p>
             <a:fld id="{0075BD33-8D5F-4D67-8F67-B28D0B7F2F08}" type="datetime1">
               <a:rPr lang="en-GB" smtClean="0"/>
-              <a:t>11/12/2015</a:t>
+              <a:t>15/12/2015</a:t>
             </a:fld>
             <a:endParaRPr lang="en-GB"/>
           </a:p>
@@ -4968,7 +5239,7 @@
           <a:p>
             <a:fld id="{633BF77B-1C97-4E77-BD1D-75274F40FC5B}" type="datetime1">
               <a:rPr lang="en-GB" smtClean="0"/>
-              <a:t>11/12/2015</a:t>
+              <a:t>15/12/2015</a:t>
             </a:fld>
             <a:endParaRPr lang="en-GB"/>
           </a:p>
@@ -5346,7 +5617,7 @@
           <a:p>
             <a:fld id="{5153D374-1A43-4F28-8430-6675858FE949}" type="datetime1">
               <a:rPr lang="en-GB" smtClean="0"/>
-              <a:t>11/12/2015</a:t>
+              <a:t>15/12/2015</a:t>
             </a:fld>
             <a:endParaRPr lang="en-GB"/>
           </a:p>
@@ -5473,7 +5744,7 @@
           <a:p>
             <a:fld id="{BA88CCDF-626B-4668-97DC-5A1BBEAB0A11}" type="datetime1">
               <a:rPr lang="en-GB" smtClean="0"/>
-              <a:t>11/12/2015</a:t>
+              <a:t>15/12/2015</a:t>
             </a:fld>
             <a:endParaRPr lang="en-GB"/>
           </a:p>
@@ -5572,7 +5843,7 @@
           <a:p>
             <a:fld id="{9760674D-D2B9-4AE0-923F-2202F9433AF2}" type="datetime1">
               <a:rPr lang="en-GB" smtClean="0"/>
-              <a:t>11/12/2015</a:t>
+              <a:t>15/12/2015</a:t>
             </a:fld>
             <a:endParaRPr lang="en-GB"/>
           </a:p>
@@ -5831,7 +6102,7 @@
           <a:p>
             <a:fld id="{319B5FBB-5ECE-4C54-9CCE-31F728E781A0}" type="datetime1">
               <a:rPr lang="en-GB" smtClean="0"/>
-              <a:t>11/12/2015</a:t>
+              <a:t>15/12/2015</a:t>
             </a:fld>
             <a:endParaRPr lang="en-GB"/>
           </a:p>
@@ -6098,7 +6369,7 @@
           <a:p>
             <a:fld id="{73C6F11D-3D21-4E28-9384-DA37B819A935}" type="datetime1">
               <a:rPr lang="en-GB" smtClean="0"/>
-              <a:t>11/12/2015</a:t>
+              <a:t>15/12/2015</a:t>
             </a:fld>
             <a:endParaRPr lang="en-GB"/>
           </a:p>
@@ -6847,7 +7118,7 @@
           <a:p>
             <a:fld id="{89F71666-4645-43A7-8D49-9FF37F68D6E1}" type="datetime1">
               <a:rPr lang="en-GB" smtClean="0"/>
-              <a:t>11/12/2015</a:t>
+              <a:t>15/12/2015</a:t>
             </a:fld>
             <a:endParaRPr lang="en-GB"/>
           </a:p>
@@ -9040,8 +9311,8 @@
           </a:p>
         </p:txBody>
       </p:sp>
-      <mc:AlternateContent xmlns:mc="http://schemas.openxmlformats.org/markup-compatibility/2006" xmlns:a14="http://schemas.microsoft.com/office/drawing/2010/main">
-        <mc:Choice Requires="a14">
+      <mc:AlternateContent xmlns:mc="http://schemas.openxmlformats.org/markup-compatibility/2006">
+        <mc:Choice xmlns:a14="http://schemas.microsoft.com/office/drawing/2010/main" Requires="a14">
           <p:sp>
             <p:nvSpPr>
               <p:cNvPr id="3" name="Content Placeholder 2"/>
@@ -9128,7 +9399,15 @@
                 </a:r>
                 <a:r>
                   <a:rPr lang="en-US" dirty="0" smtClean="0"/>
-                  <a:t>and terminating at vertex </a:t>
+                  <a:t>and </a:t>
+                </a:r>
+                <a:r>
+                  <a:rPr lang="en-US" u="sng" dirty="0" smtClean="0"/>
+                  <a:t>terminating</a:t>
+                </a:r>
+                <a:r>
+                  <a:rPr lang="en-US" dirty="0" smtClean="0"/>
+                  <a:t> at vertex </a:t>
                 </a:r>
                 <a14:m>
                   <m:oMath xmlns:m="http://schemas.openxmlformats.org/officeDocument/2006/math">
@@ -9149,7 +9428,7 @@
             </p:txBody>
           </p:sp>
         </mc:Choice>
-        <mc:Fallback xmlns="">
+        <mc:Fallback>
           <p:sp>
             <p:nvSpPr>
               <p:cNvPr id="3" name="Content Placeholder 2"/>
@@ -9173,7 +9452,7 @@
               <a:lstStyle/>
               <a:p>
                 <a:r>
-                  <a:rPr lang="en-GB">
+                  <a:rPr lang="nl-NL">
                     <a:noFill/>
                   </a:rPr>
                   <a:t> </a:t>
@@ -9776,8 +10055,8 @@
           </a:p>
         </p:txBody>
       </p:sp>
-      <mc:AlternateContent xmlns:mc="http://schemas.openxmlformats.org/markup-compatibility/2006" xmlns:a14="http://schemas.microsoft.com/office/drawing/2010/main">
-        <mc:Choice Requires="a14">
+      <mc:AlternateContent xmlns:mc="http://schemas.openxmlformats.org/markup-compatibility/2006">
+        <mc:Choice xmlns:a14="http://schemas.microsoft.com/office/drawing/2010/main" Requires="a14">
           <p:sp>
             <p:nvSpPr>
               <p:cNvPr id="3" name="Content Placeholder 2"/>
@@ -9795,7 +10074,7 @@
               <a:p>
                 <a:r>
                   <a:rPr lang="en-GB" dirty="0" smtClean="0"/>
-                  <a:t>Walk from </a:t>
+                  <a:t>Path from </a:t>
                 </a:r>
                 <a14:m>
                   <m:oMath xmlns:m="http://schemas.openxmlformats.org/officeDocument/2006/math">
@@ -10228,7 +10507,7 @@
             </p:txBody>
           </p:sp>
         </mc:Choice>
-        <mc:Fallback xmlns="">
+        <mc:Fallback>
           <p:sp>
             <p:nvSpPr>
               <p:cNvPr id="3" name="Content Placeholder 2"/>
@@ -12145,8 +12424,8 @@
           </a:p>
         </p:txBody>
       </p:sp>
-      <mc:AlternateContent xmlns:mc="http://schemas.openxmlformats.org/markup-compatibility/2006" xmlns:a14="http://schemas.microsoft.com/office/drawing/2010/main">
-        <mc:Choice Requires="a14">
+      <mc:AlternateContent xmlns:mc="http://schemas.openxmlformats.org/markup-compatibility/2006">
+        <mc:Choice xmlns:a14="http://schemas.microsoft.com/office/drawing/2010/main" Requires="a14">
           <p:sp>
             <p:nvSpPr>
               <p:cNvPr id="3" name="Content Placeholder 2"/>
@@ -12157,9 +12436,16 @@
                 <p:ph idx="1"/>
               </p:nvPr>
             </p:nvSpPr>
-            <p:spPr/>
+            <p:spPr>
+              <a:xfrm>
+                <a:off x="677334" y="2160589"/>
+                <a:ext cx="8596668" cy="4245898"/>
+              </a:xfrm>
+            </p:spPr>
             <p:txBody>
-              <a:bodyPr/>
+              <a:bodyPr>
+                <a:normAutofit/>
+              </a:bodyPr>
               <a:lstStyle/>
               <a:p>
                 <a:r>
@@ -12335,44 +12621,144 @@
                 </a:r>
                 <a:r>
                   <a:rPr lang="nl-NL" dirty="0" smtClean="0"/>
-                  <a:t> of a queue</a:t>
-                </a:r>
+                  <a:t> of a </a:t>
+                </a:r>
+                <a:r>
+                  <a:rPr lang="nl-NL" dirty="0" smtClean="0"/>
+                  <a:t>queue</a:t>
+                </a:r>
+              </a:p>
+              <a:p>
+                <a:pPr lvl="2"/>
+                <a:r>
+                  <a:rPr lang="nl-NL" i="1" dirty="0" smtClean="0"/>
+                  <a:t>Push</a:t>
+                </a:r>
+                <a:r>
+                  <a:rPr lang="nl-NL" dirty="0" smtClean="0"/>
+                  <a:t> </a:t>
+                </a:r>
+                <a:r>
+                  <a:rPr lang="nl-NL" dirty="0" err="1" smtClean="0"/>
+                  <a:t>only</a:t>
+                </a:r>
+                <a:r>
+                  <a:rPr lang="nl-NL" dirty="0" smtClean="0"/>
+                  <a:t> </a:t>
+                </a:r>
+                <a:r>
+                  <a:rPr lang="nl-NL" dirty="0" err="1" smtClean="0"/>
+                  <a:t>the</a:t>
+                </a:r>
+                <a:r>
+                  <a:rPr lang="nl-NL" dirty="0" smtClean="0"/>
+                  <a:t> first </a:t>
+                </a:r>
+                <a:r>
+                  <a:rPr lang="nl-NL" dirty="0" err="1" smtClean="0"/>
+                  <a:t>unvisited</a:t>
+                </a:r>
+                <a:r>
+                  <a:rPr lang="nl-NL" dirty="0" smtClean="0"/>
+                  <a:t> </a:t>
+                </a:r>
+                <a:r>
+                  <a:rPr lang="nl-NL" dirty="0" err="1" smtClean="0"/>
+                  <a:t>neigbour</a:t>
+                </a:r>
+                <a:r>
+                  <a:rPr lang="nl-NL" dirty="0" smtClean="0"/>
+                  <a:t> of </a:t>
+                </a:r>
+                <a:r>
+                  <a:rPr lang="nl-NL" dirty="0" err="1" smtClean="0"/>
+                  <a:t>the</a:t>
+                </a:r>
+                <a:r>
+                  <a:rPr lang="nl-NL" dirty="0" smtClean="0"/>
+                  <a:t> top element of </a:t>
+                </a:r>
+                <a:r>
+                  <a:rPr lang="nl-NL" dirty="0" err="1" smtClean="0"/>
+                  <a:t>the</a:t>
+                </a:r>
+                <a:r>
+                  <a:rPr lang="nl-NL" dirty="0" smtClean="0"/>
+                  <a:t> stack</a:t>
+                </a:r>
+              </a:p>
+              <a:p>
+                <a:pPr lvl="2"/>
+                <a:r>
+                  <a:rPr lang="nl-NL" i="1" dirty="0" smtClean="0"/>
+                  <a:t>Pop </a:t>
+                </a:r>
+                <a:r>
+                  <a:rPr lang="nl-NL" dirty="0" err="1" smtClean="0"/>
+                  <a:t>from</a:t>
+                </a:r>
+                <a:r>
+                  <a:rPr lang="nl-NL" dirty="0" smtClean="0"/>
+                  <a:t> </a:t>
+                </a:r>
+                <a:r>
+                  <a:rPr lang="nl-NL" dirty="0" err="1" smtClean="0"/>
+                  <a:t>the</a:t>
+                </a:r>
+                <a:r>
+                  <a:rPr lang="nl-NL" dirty="0" smtClean="0"/>
+                  <a:t> stack </a:t>
+                </a:r>
+                <a:r>
+                  <a:rPr lang="nl-NL" dirty="0" err="1" smtClean="0"/>
+                  <a:t>if</a:t>
+                </a:r>
+                <a:r>
+                  <a:rPr lang="nl-NL" dirty="0" smtClean="0"/>
+                  <a:t> </a:t>
+                </a:r>
+                <a:r>
+                  <a:rPr lang="nl-NL" dirty="0" err="1" smtClean="0"/>
+                  <a:t>there</a:t>
+                </a:r>
+                <a:r>
+                  <a:rPr lang="nl-NL" dirty="0" smtClean="0"/>
+                  <a:t> are no </a:t>
+                </a:r>
+                <a:r>
+                  <a:rPr lang="nl-NL" dirty="0" err="1" smtClean="0"/>
+                  <a:t>other</a:t>
+                </a:r>
+                <a:r>
+                  <a:rPr lang="nl-NL" dirty="0" smtClean="0"/>
+                  <a:t> </a:t>
+                </a:r>
+                <a:r>
+                  <a:rPr lang="nl-NL" dirty="0" err="1" smtClean="0"/>
+                  <a:t>unvisited</a:t>
+                </a:r>
+                <a:r>
+                  <a:rPr lang="nl-NL" dirty="0" smtClean="0"/>
+                  <a:t> </a:t>
+                </a:r>
+                <a:r>
+                  <a:rPr lang="nl-NL" dirty="0" err="1" smtClean="0"/>
+                  <a:t>neighbours</a:t>
+                </a:r>
+                <a:endParaRPr lang="en-GB" dirty="0"/>
               </a:p>
               <a:p>
                 <a:pPr lvl="1"/>
                 <a:r>
-                  <a:rPr lang="nl-NL" dirty="0" smtClean="0"/>
-                  <a:t>A </a:t>
-                </a:r>
-                <a:r>
-                  <a:rPr lang="nl-NL" dirty="0" err="1" smtClean="0"/>
-                  <a:t>recursive</a:t>
-                </a:r>
-                <a:r>
-                  <a:rPr lang="nl-NL" dirty="0" smtClean="0"/>
-                  <a:t> </a:t>
-                </a:r>
-                <a:r>
-                  <a:rPr lang="nl-NL" dirty="0" err="1" smtClean="0"/>
-                  <a:t>implementation</a:t>
-                </a:r>
-                <a:r>
-                  <a:rPr lang="nl-NL" dirty="0" smtClean="0"/>
-                  <a:t> is </a:t>
-                </a:r>
-                <a:r>
-                  <a:rPr lang="nl-NL" dirty="0" err="1" smtClean="0"/>
-                  <a:t>possible</a:t>
-                </a:r>
-                <a:endParaRPr lang="en-GB" dirty="0"/>
-              </a:p>
-              <a:p>
-                <a:endParaRPr lang="en-GB" dirty="0"/>
+                  <a:rPr lang="en-GB" dirty="0" smtClean="0"/>
+                  <a:t>A recursive implementation is possible</a:t>
+                </a:r>
+                <a:endParaRPr lang="nl-NL" dirty="0" smtClean="0"/>
               </a:p>
             </p:txBody>
           </p:sp>
         </mc:Choice>
-        <mc:Fallback xmlns="">
+        <mc:Fallback>
           <p:sp>
             <p:nvSpPr>
               <p:cNvPr id="3" name="Content Placeholder 2"/>
@@ -12384,10 +12770,14 @@
               </p:nvPr>
             </p:nvSpPr>
             <p:spPr>
+              <a:xfrm>
+                <a:off x="677334" y="2160589"/>
+                <a:ext cx="8596668" cy="4245898"/>
+              </a:xfrm>
               <a:blipFill rotWithShape="0">
-                <a:blip r:embed="rId2"/>
+                <a:blip r:embed="rId3"/>
                 <a:stretch>
-                  <a:fillRect l="-142" t="-942"/>
+                  <a:fillRect l="-142" t="-861"/>
                 </a:stretch>
               </a:blipFill>
             </p:spPr>
@@ -12396,7 +12786,7 @@
               <a:lstStyle/>
               <a:p>
                 <a:r>
-                  <a:rPr lang="en-GB">
+                  <a:rPr lang="nl-NL">
                     <a:noFill/>
                   </a:rPr>
                   <a:t> </a:t>
@@ -13271,7 +13661,7 @@
           <p:nvPr/>
         </p:nvPicPr>
         <p:blipFill>
-          <a:blip r:embed="rId2">
+          <a:blip r:embed="rId3">
             <a:extLst>
               <a:ext uri="{28A0092B-C50C-407E-A947-70E740481C1C}">
                 <a14:useLocalDpi xmlns:a14="http://schemas.microsoft.com/office/drawing/2010/main" val="0"/>

</xml_diff>